<commit_message>
add sub-link extraction and walk-through LLM training
</commit_message>
<xml_diff>
--- a/method_explore.pptx
+++ b/method_explore.pptx
@@ -21,6 +21,8 @@
     <p:sldId id="264" r:id="rId14"/>
     <p:sldId id="265" r:id="rId15"/>
     <p:sldId id="266" r:id="rId16"/>
+    <p:sldId id="267" r:id="rId17"/>
+    <p:sldId id="268" r:id="rId18"/>
   </p:sldIdLst>
   <p:sldSz cx="12192000" cy="6858000"/>
   <p:notesSz cx="6858000" cy="9144000"/>
@@ -305,7 +307,7 @@
           </a:bodyPr>
           <a:p>
             <a:pPr algn="r"/>
-            <a:fld id="{CB7E1F92-BC62-425A-9B79-56ADDF25A323}" type="slidenum">
+            <a:fld id="{9E865C24-754A-4F6F-9772-77B11680F57E}" type="slidenum">
               <a:rPr b="0" lang="en-US" sz="1400" spc="-1" strike="noStrike">
                 <a:latin typeface="Times New Roman"/>
               </a:rPr>
@@ -342,7 +344,7 @@
       </p:grpSpPr>
       <p:sp>
         <p:nvSpPr>
-          <p:cNvPr id="189" name="PlaceHolder 1"/>
+          <p:cNvPr id="206" name="PlaceHolder 1"/>
           <p:cNvSpPr>
             <a:spLocks noGrp="1"/>
           </p:cNvSpPr>
@@ -353,16 +355,16 @@
         <p:spPr>
           <a:xfrm>
             <a:off x="380880" y="685800"/>
-            <a:ext cx="6094800" cy="3427920"/>
-          </a:xfrm>
-          <a:prstGeom prst="rect">
-            <a:avLst/>
-          </a:prstGeom>
-        </p:spPr>
-      </p:sp>
-      <p:sp>
-        <p:nvSpPr>
-          <p:cNvPr id="190" name="PlaceHolder 2"/>
+            <a:ext cx="6094440" cy="3427560"/>
+          </a:xfrm>
+          <a:prstGeom prst="rect">
+            <a:avLst/>
+          </a:prstGeom>
+        </p:spPr>
+      </p:sp>
+      <p:sp>
+        <p:nvSpPr>
+          <p:cNvPr id="207" name="PlaceHolder 2"/>
           <p:cNvSpPr>
             <a:spLocks noGrp="1"/>
           </p:cNvSpPr>
@@ -373,7 +375,7 @@
         <p:spPr>
           <a:xfrm>
             <a:off x="685800" y="4343400"/>
-            <a:ext cx="5485320" cy="4113720"/>
+            <a:ext cx="5484960" cy="4113360"/>
           </a:xfrm>
           <a:prstGeom prst="rect">
             <a:avLst/>
@@ -392,14 +394,14 @@
       </p:sp>
       <p:sp>
         <p:nvSpPr>
-          <p:cNvPr id="191" name="CustomShape 3"/>
+          <p:cNvPr id="208" name="CustomShape 3"/>
           <p:cNvSpPr/>
           <p:nvPr/>
         </p:nvSpPr>
         <p:spPr>
           <a:xfrm>
             <a:off x="3884760" y="8685360"/>
-            <a:ext cx="2970720" cy="456120"/>
+            <a:ext cx="2970360" cy="455760"/>
           </a:xfrm>
           <a:prstGeom prst="rect">
             <a:avLst/>
@@ -425,7 +427,7 @@
                 <a:spcPct val="100000"/>
               </a:lnSpc>
             </a:pPr>
-            <a:fld id="{2E3F58E8-9DA7-4E66-B111-3793369A33B4}" type="slidenum">
+            <a:fld id="{F5CBC12C-F756-42BB-AAF3-5B4715E87FDC}" type="slidenum">
               <a:rPr b="0" lang="en-US" sz="1200" spc="-1" strike="noStrike">
                 <a:solidFill>
                   <a:srgbClr val="000000"/>
@@ -465,7 +467,7 @@
       </p:grpSpPr>
       <p:sp>
         <p:nvSpPr>
-          <p:cNvPr id="174" name="PlaceHolder 1"/>
+          <p:cNvPr id="191" name="PlaceHolder 1"/>
           <p:cNvSpPr>
             <a:spLocks noGrp="1"/>
           </p:cNvSpPr>
@@ -476,16 +478,16 @@
         <p:spPr>
           <a:xfrm>
             <a:off x="380880" y="685800"/>
-            <a:ext cx="6094800" cy="3427920"/>
-          </a:xfrm>
-          <a:prstGeom prst="rect">
-            <a:avLst/>
-          </a:prstGeom>
-        </p:spPr>
-      </p:sp>
-      <p:sp>
-        <p:nvSpPr>
-          <p:cNvPr id="175" name="PlaceHolder 2"/>
+            <a:ext cx="6094440" cy="3427560"/>
+          </a:xfrm>
+          <a:prstGeom prst="rect">
+            <a:avLst/>
+          </a:prstGeom>
+        </p:spPr>
+      </p:sp>
+      <p:sp>
+        <p:nvSpPr>
+          <p:cNvPr id="192" name="PlaceHolder 2"/>
           <p:cNvSpPr>
             <a:spLocks noGrp="1"/>
           </p:cNvSpPr>
@@ -496,7 +498,7 @@
         <p:spPr>
           <a:xfrm>
             <a:off x="685800" y="4343400"/>
-            <a:ext cx="5485320" cy="4113720"/>
+            <a:ext cx="5484960" cy="4113360"/>
           </a:xfrm>
           <a:prstGeom prst="rect">
             <a:avLst/>
@@ -515,14 +517,14 @@
       </p:sp>
       <p:sp>
         <p:nvSpPr>
-          <p:cNvPr id="176" name="CustomShape 3"/>
+          <p:cNvPr id="193" name="CustomShape 3"/>
           <p:cNvSpPr/>
           <p:nvPr/>
         </p:nvSpPr>
         <p:spPr>
           <a:xfrm>
             <a:off x="3884760" y="8685360"/>
-            <a:ext cx="2970720" cy="456120"/>
+            <a:ext cx="2970360" cy="455760"/>
           </a:xfrm>
           <a:prstGeom prst="rect">
             <a:avLst/>
@@ -551,7 +553,7 @@
                 <a:tab algn="l" pos="0"/>
               </a:tabLst>
             </a:pPr>
-            <a:fld id="{D2D600B4-12F2-4D8B-8EC1-BD7DDCF22C51}" type="slidenum">
+            <a:fld id="{79242264-09D3-40A3-B1BC-C9254522CB2D}" type="slidenum">
               <a:rPr b="0" lang="en-US" sz="1200" spc="-1" strike="noStrike">
                 <a:solidFill>
                   <a:srgbClr val="000000"/>
@@ -591,7 +593,7 @@
       </p:grpSpPr>
       <p:sp>
         <p:nvSpPr>
-          <p:cNvPr id="177" name="PlaceHolder 1"/>
+          <p:cNvPr id="194" name="PlaceHolder 1"/>
           <p:cNvSpPr>
             <a:spLocks noGrp="1"/>
           </p:cNvSpPr>
@@ -602,16 +604,16 @@
         <p:spPr>
           <a:xfrm>
             <a:off x="380880" y="685800"/>
-            <a:ext cx="6094800" cy="3427920"/>
-          </a:xfrm>
-          <a:prstGeom prst="rect">
-            <a:avLst/>
-          </a:prstGeom>
-        </p:spPr>
-      </p:sp>
-      <p:sp>
-        <p:nvSpPr>
-          <p:cNvPr id="178" name="PlaceHolder 2"/>
+            <a:ext cx="6094440" cy="3427560"/>
+          </a:xfrm>
+          <a:prstGeom prst="rect">
+            <a:avLst/>
+          </a:prstGeom>
+        </p:spPr>
+      </p:sp>
+      <p:sp>
+        <p:nvSpPr>
+          <p:cNvPr id="195" name="PlaceHolder 2"/>
           <p:cNvSpPr>
             <a:spLocks noGrp="1"/>
           </p:cNvSpPr>
@@ -622,7 +624,7 @@
         <p:spPr>
           <a:xfrm>
             <a:off x="685800" y="4343400"/>
-            <a:ext cx="5485320" cy="4113720"/>
+            <a:ext cx="5484960" cy="4113360"/>
           </a:xfrm>
           <a:prstGeom prst="rect">
             <a:avLst/>
@@ -641,14 +643,14 @@
       </p:sp>
       <p:sp>
         <p:nvSpPr>
-          <p:cNvPr id="179" name="CustomShape 3"/>
+          <p:cNvPr id="196" name="CustomShape 3"/>
           <p:cNvSpPr/>
           <p:nvPr/>
         </p:nvSpPr>
         <p:spPr>
           <a:xfrm>
             <a:off x="3884760" y="8685360"/>
-            <a:ext cx="2970720" cy="456120"/>
+            <a:ext cx="2970360" cy="455760"/>
           </a:xfrm>
           <a:prstGeom prst="rect">
             <a:avLst/>
@@ -677,7 +679,7 @@
                 <a:tab algn="l" pos="0"/>
               </a:tabLst>
             </a:pPr>
-            <a:fld id="{6C2C3E19-B6C5-4F51-89A7-1D6936527C5D}" type="slidenum">
+            <a:fld id="{6D88C5AD-DB01-4093-B530-F294FB88AAAB}" type="slidenum">
               <a:rPr b="0" lang="en-US" sz="1200" spc="-1" strike="noStrike">
                 <a:solidFill>
                   <a:srgbClr val="000000"/>
@@ -717,7 +719,7 @@
       </p:grpSpPr>
       <p:sp>
         <p:nvSpPr>
-          <p:cNvPr id="180" name="PlaceHolder 1"/>
+          <p:cNvPr id="197" name="PlaceHolder 1"/>
           <p:cNvSpPr>
             <a:spLocks noGrp="1"/>
           </p:cNvSpPr>
@@ -728,16 +730,16 @@
         <p:spPr>
           <a:xfrm>
             <a:off x="380880" y="685800"/>
-            <a:ext cx="6094800" cy="3427920"/>
-          </a:xfrm>
-          <a:prstGeom prst="rect">
-            <a:avLst/>
-          </a:prstGeom>
-        </p:spPr>
-      </p:sp>
-      <p:sp>
-        <p:nvSpPr>
-          <p:cNvPr id="181" name="PlaceHolder 2"/>
+            <a:ext cx="6094440" cy="3427560"/>
+          </a:xfrm>
+          <a:prstGeom prst="rect">
+            <a:avLst/>
+          </a:prstGeom>
+        </p:spPr>
+      </p:sp>
+      <p:sp>
+        <p:nvSpPr>
+          <p:cNvPr id="198" name="PlaceHolder 2"/>
           <p:cNvSpPr>
             <a:spLocks noGrp="1"/>
           </p:cNvSpPr>
@@ -748,7 +750,7 @@
         <p:spPr>
           <a:xfrm>
             <a:off x="685800" y="4343400"/>
-            <a:ext cx="5485320" cy="4113720"/>
+            <a:ext cx="5484960" cy="4113360"/>
           </a:xfrm>
           <a:prstGeom prst="rect">
             <a:avLst/>
@@ -767,14 +769,14 @@
       </p:sp>
       <p:sp>
         <p:nvSpPr>
-          <p:cNvPr id="182" name="CustomShape 3"/>
+          <p:cNvPr id="199" name="CustomShape 3"/>
           <p:cNvSpPr/>
           <p:nvPr/>
         </p:nvSpPr>
         <p:spPr>
           <a:xfrm>
             <a:off x="3884760" y="8685360"/>
-            <a:ext cx="2970720" cy="456120"/>
+            <a:ext cx="2970360" cy="455760"/>
           </a:xfrm>
           <a:prstGeom prst="rect">
             <a:avLst/>
@@ -803,7 +805,7 @@
                 <a:tab algn="l" pos="0"/>
               </a:tabLst>
             </a:pPr>
-            <a:fld id="{0C2E8EA7-D3FD-4AF0-9BFF-C8CCAE9094DE}" type="slidenum">
+            <a:fld id="{62F24DAB-30C5-449B-9FAD-3A8512B4F559}" type="slidenum">
               <a:rPr b="0" lang="en-US" sz="1200" spc="-1" strike="noStrike">
                 <a:solidFill>
                   <a:srgbClr val="000000"/>
@@ -843,7 +845,7 @@
       </p:grpSpPr>
       <p:sp>
         <p:nvSpPr>
-          <p:cNvPr id="183" name="PlaceHolder 1"/>
+          <p:cNvPr id="200" name="PlaceHolder 1"/>
           <p:cNvSpPr>
             <a:spLocks noGrp="1"/>
           </p:cNvSpPr>
@@ -854,16 +856,16 @@
         <p:spPr>
           <a:xfrm>
             <a:off x="380880" y="685800"/>
-            <a:ext cx="6094800" cy="3427920"/>
-          </a:xfrm>
-          <a:prstGeom prst="rect">
-            <a:avLst/>
-          </a:prstGeom>
-        </p:spPr>
-      </p:sp>
-      <p:sp>
-        <p:nvSpPr>
-          <p:cNvPr id="184" name="PlaceHolder 2"/>
+            <a:ext cx="6094440" cy="3427560"/>
+          </a:xfrm>
+          <a:prstGeom prst="rect">
+            <a:avLst/>
+          </a:prstGeom>
+        </p:spPr>
+      </p:sp>
+      <p:sp>
+        <p:nvSpPr>
+          <p:cNvPr id="201" name="PlaceHolder 2"/>
           <p:cNvSpPr>
             <a:spLocks noGrp="1"/>
           </p:cNvSpPr>
@@ -874,7 +876,7 @@
         <p:spPr>
           <a:xfrm>
             <a:off x="685800" y="4343400"/>
-            <a:ext cx="5485320" cy="4113720"/>
+            <a:ext cx="5484960" cy="4113360"/>
           </a:xfrm>
           <a:prstGeom prst="rect">
             <a:avLst/>
@@ -893,14 +895,14 @@
       </p:sp>
       <p:sp>
         <p:nvSpPr>
-          <p:cNvPr id="185" name="CustomShape 3"/>
+          <p:cNvPr id="202" name="CustomShape 3"/>
           <p:cNvSpPr/>
           <p:nvPr/>
         </p:nvSpPr>
         <p:spPr>
           <a:xfrm>
             <a:off x="3884760" y="8685360"/>
-            <a:ext cx="2970720" cy="456120"/>
+            <a:ext cx="2970360" cy="455760"/>
           </a:xfrm>
           <a:prstGeom prst="rect">
             <a:avLst/>
@@ -926,7 +928,7 @@
                 <a:spcPct val="100000"/>
               </a:lnSpc>
             </a:pPr>
-            <a:fld id="{B18B538E-CE2E-4DE7-A5D3-524434E76609}" type="slidenum">
+            <a:fld id="{693749F2-2264-4539-9FEC-5A6354F58B4E}" type="slidenum">
               <a:rPr b="0" lang="en-US" sz="1200" spc="-1" strike="noStrike">
                 <a:solidFill>
                   <a:srgbClr val="000000"/>
@@ -966,7 +968,7 @@
       </p:grpSpPr>
       <p:sp>
         <p:nvSpPr>
-          <p:cNvPr id="186" name="PlaceHolder 1"/>
+          <p:cNvPr id="203" name="PlaceHolder 1"/>
           <p:cNvSpPr>
             <a:spLocks noGrp="1"/>
           </p:cNvSpPr>
@@ -977,16 +979,16 @@
         <p:spPr>
           <a:xfrm>
             <a:off x="380880" y="685800"/>
-            <a:ext cx="6094800" cy="3427920"/>
-          </a:xfrm>
-          <a:prstGeom prst="rect">
-            <a:avLst/>
-          </a:prstGeom>
-        </p:spPr>
-      </p:sp>
-      <p:sp>
-        <p:nvSpPr>
-          <p:cNvPr id="187" name="PlaceHolder 2"/>
+            <a:ext cx="6094440" cy="3427560"/>
+          </a:xfrm>
+          <a:prstGeom prst="rect">
+            <a:avLst/>
+          </a:prstGeom>
+        </p:spPr>
+      </p:sp>
+      <p:sp>
+        <p:nvSpPr>
+          <p:cNvPr id="204" name="PlaceHolder 2"/>
           <p:cNvSpPr>
             <a:spLocks noGrp="1"/>
           </p:cNvSpPr>
@@ -997,7 +999,7 @@
         <p:spPr>
           <a:xfrm>
             <a:off x="685800" y="4343400"/>
-            <a:ext cx="5485320" cy="4113720"/>
+            <a:ext cx="5484960" cy="4113360"/>
           </a:xfrm>
           <a:prstGeom prst="rect">
             <a:avLst/>
@@ -1016,14 +1018,14 @@
       </p:sp>
       <p:sp>
         <p:nvSpPr>
-          <p:cNvPr id="188" name="CustomShape 3"/>
+          <p:cNvPr id="205" name="CustomShape 3"/>
           <p:cNvSpPr/>
           <p:nvPr/>
         </p:nvSpPr>
         <p:spPr>
           <a:xfrm>
             <a:off x="3884760" y="8685360"/>
-            <a:ext cx="2970720" cy="456120"/>
+            <a:ext cx="2970360" cy="455760"/>
           </a:xfrm>
           <a:prstGeom prst="rect">
             <a:avLst/>
@@ -1049,7 +1051,7 @@
                 <a:spcPct val="100000"/>
               </a:lnSpc>
             </a:pPr>
-            <a:fld id="{95E238C9-74DD-4E9B-937E-01E8964E541E}" type="slidenum">
+            <a:fld id="{814023FA-3467-4419-A80F-70252049CC6E}" type="slidenum">
               <a:rPr b="0" lang="en-US" sz="1200" spc="-1" strike="noStrike">
                 <a:solidFill>
                   <a:srgbClr val="000000"/>
@@ -5171,7 +5173,7 @@
         <p:spPr>
           <a:xfrm>
             <a:off x="11242080" y="6450480"/>
-            <a:ext cx="355680" cy="223560"/>
+            <a:ext cx="355320" cy="223200"/>
           </a:xfrm>
           <a:prstGeom prst="rect">
             <a:avLst/>
@@ -5197,7 +5199,7 @@
                 <a:spcPct val="100000"/>
               </a:lnSpc>
             </a:pPr>
-            <a:fld id="{A07FFB77-854D-4558-9B12-125475BFC926}" type="slidenum">
+            <a:fld id="{04BAC16D-A59A-41B8-9006-0358D1A34AD2}" type="slidenum">
               <a:rPr b="0" lang="en-US" sz="1100" spc="-1" strike="noStrike">
                 <a:solidFill>
                   <a:srgbClr val="676a6e"/>
@@ -5205,7 +5207,7 @@
                 <a:latin typeface="Trebuchet MS"/>
                 <a:ea typeface="DejaVu Sans"/>
               </a:rPr>
-              <a:t>11</a:t>
+              <a:t>&lt;number&gt;</a:t>
             </a:fld>
             <a:endParaRPr b="0" lang="en-US" sz="1100" spc="-1" strike="noStrike">
               <a:latin typeface="Arial"/>
@@ -5222,7 +5224,7 @@
         <p:spPr>
           <a:xfrm>
             <a:off x="5135400" y="6581160"/>
-            <a:ext cx="1959480" cy="425880"/>
+            <a:ext cx="1959120" cy="425880"/>
           </a:xfrm>
           <a:prstGeom prst="rect">
             <a:avLst/>
@@ -5277,7 +5279,7 @@
         <p:spPr>
           <a:xfrm>
             <a:off x="9579960" y="257760"/>
-            <a:ext cx="2306520" cy="713160"/>
+            <a:ext cx="2306160" cy="712800"/>
           </a:xfrm>
           <a:prstGeom prst="rect">
             <a:avLst/>
@@ -5300,7 +5302,7 @@
         <p:spPr>
           <a:xfrm>
             <a:off x="0" y="4748400"/>
-            <a:ext cx="12191040" cy="2150640"/>
+            <a:ext cx="12190680" cy="2150280"/>
           </a:xfrm>
           <a:prstGeom prst="rect">
             <a:avLst/>
@@ -5323,7 +5325,7 @@
         <p:spPr>
           <a:xfrm>
             <a:off x="609480" y="273600"/>
-            <a:ext cx="10972080" cy="1144440"/>
+            <a:ext cx="10972440" cy="1144800"/>
           </a:xfrm>
           <a:prstGeom prst="rect">
             <a:avLst/>
@@ -5334,31 +5336,14 @@
             <a:noAutofit/>
           </a:bodyPr>
           <a:p>
-            <a:r>
-              <a:rPr b="0" lang="en-US" sz="1800" spc="-1" strike="noStrike">
+            <a:pPr algn="ctr"/>
+            <a:r>
+              <a:rPr b="0" lang="en-US" sz="4400" spc="-1" strike="noStrike">
                 <a:latin typeface="Arial"/>
               </a:rPr>
-              <a:t>Click to </a:t>
-            </a:r>
-            <a:r>
-              <a:rPr b="0" lang="en-US" sz="1800" spc="-1" strike="noStrike">
-                <a:latin typeface="Arial"/>
-              </a:rPr>
-              <a:t>edit the </a:t>
-            </a:r>
-            <a:r>
-              <a:rPr b="0" lang="en-US" sz="1800" spc="-1" strike="noStrike">
-                <a:latin typeface="Arial"/>
-              </a:rPr>
-              <a:t>title text </a:t>
-            </a:r>
-            <a:r>
-              <a:rPr b="0" lang="en-US" sz="1800" spc="-1" strike="noStrike">
-                <a:latin typeface="Arial"/>
-              </a:rPr>
-              <a:t>format</a:t>
-            </a:r>
-            <a:endParaRPr b="0" lang="en-US" sz="1800" spc="-1" strike="noStrike">
+              <a:t>Click to edit the title text format</a:t>
+            </a:r>
+            <a:endParaRPr b="0" lang="en-US" sz="4400" spc="-1" strike="noStrike">
               <a:latin typeface="Arial"/>
             </a:endParaRPr>
           </a:p>
@@ -5377,7 +5362,7 @@
         <p:spPr>
           <a:xfrm>
             <a:off x="609480" y="1604520"/>
-            <a:ext cx="10972080" cy="3976920"/>
+            <a:ext cx="10972440" cy="3977280"/>
           </a:xfrm>
           <a:prstGeom prst="rect">
             <a:avLst/>
@@ -5400,12 +5385,12 @@
               <a:buChar char=""/>
             </a:pPr>
             <a:r>
-              <a:rPr b="0" lang="en-US" sz="1800" spc="-1" strike="noStrike">
+              <a:rPr b="0" lang="en-US" sz="3200" spc="-1" strike="noStrike">
                 <a:latin typeface="Arial"/>
               </a:rPr>
               <a:t>Click to edit the outline text format</a:t>
             </a:r>
-            <a:endParaRPr b="0" lang="en-US" sz="1800" spc="-1" strike="noStrike">
+            <a:endParaRPr b="0" lang="en-US" sz="3200" spc="-1" strike="noStrike">
               <a:latin typeface="Arial"/>
             </a:endParaRPr>
           </a:p>
@@ -5422,12 +5407,12 @@
               <a:buChar char=""/>
             </a:pPr>
             <a:r>
-              <a:rPr b="0" lang="en-US" sz="1800" spc="-1" strike="noStrike">
+              <a:rPr b="0" lang="en-US" sz="2800" spc="-1" strike="noStrike">
                 <a:latin typeface="Arial"/>
               </a:rPr>
               <a:t>Second Outline Level</a:t>
             </a:r>
-            <a:endParaRPr b="0" lang="en-US" sz="1800" spc="-1" strike="noStrike">
+            <a:endParaRPr b="0" lang="en-US" sz="2800" spc="-1" strike="noStrike">
               <a:latin typeface="Arial"/>
             </a:endParaRPr>
           </a:p>
@@ -5444,12 +5429,12 @@
               <a:buChar char=""/>
             </a:pPr>
             <a:r>
-              <a:rPr b="0" lang="en-US" sz="1800" spc="-1" strike="noStrike">
+              <a:rPr b="0" lang="en-US" sz="2400" spc="-1" strike="noStrike">
                 <a:latin typeface="Arial"/>
               </a:rPr>
               <a:t>Third Outline Level</a:t>
             </a:r>
-            <a:endParaRPr b="0" lang="en-US" sz="1800" spc="-1" strike="noStrike">
+            <a:endParaRPr b="0" lang="en-US" sz="2400" spc="-1" strike="noStrike">
               <a:latin typeface="Arial"/>
             </a:endParaRPr>
           </a:p>
@@ -5466,12 +5451,12 @@
               <a:buChar char=""/>
             </a:pPr>
             <a:r>
-              <a:rPr b="0" lang="en-US" sz="1800" spc="-1" strike="noStrike">
+              <a:rPr b="0" lang="en-US" sz="2000" spc="-1" strike="noStrike">
                 <a:latin typeface="Arial"/>
               </a:rPr>
               <a:t>Fourth Outline Level</a:t>
             </a:r>
-            <a:endParaRPr b="0" lang="en-US" sz="1800" spc="-1" strike="noStrike">
+            <a:endParaRPr b="0" lang="en-US" sz="2000" spc="-1" strike="noStrike">
               <a:latin typeface="Arial"/>
             </a:endParaRPr>
           </a:p>
@@ -5488,12 +5473,12 @@
               <a:buChar char=""/>
             </a:pPr>
             <a:r>
-              <a:rPr b="0" lang="en-US" sz="1800" spc="-1" strike="noStrike">
+              <a:rPr b="0" lang="en-US" sz="2000" spc="-1" strike="noStrike">
                 <a:latin typeface="Arial"/>
               </a:rPr>
               <a:t>Fifth Outline Level</a:t>
             </a:r>
-            <a:endParaRPr b="0" lang="en-US" sz="1800" spc="-1" strike="noStrike">
+            <a:endParaRPr b="0" lang="en-US" sz="2000" spc="-1" strike="noStrike">
               <a:latin typeface="Arial"/>
             </a:endParaRPr>
           </a:p>
@@ -5510,12 +5495,12 @@
               <a:buChar char=""/>
             </a:pPr>
             <a:r>
-              <a:rPr b="0" lang="en-US" sz="1800" spc="-1" strike="noStrike">
+              <a:rPr b="0" lang="en-US" sz="2000" spc="-1" strike="noStrike">
                 <a:latin typeface="Arial"/>
               </a:rPr>
               <a:t>Sixth Outline Level</a:t>
             </a:r>
-            <a:endParaRPr b="0" lang="en-US" sz="1800" spc="-1" strike="noStrike">
+            <a:endParaRPr b="0" lang="en-US" sz="2000" spc="-1" strike="noStrike">
               <a:latin typeface="Arial"/>
             </a:endParaRPr>
           </a:p>
@@ -5532,12 +5517,12 @@
               <a:buChar char=""/>
             </a:pPr>
             <a:r>
-              <a:rPr b="0" lang="en-US" sz="1800" spc="-1" strike="noStrike">
+              <a:rPr b="0" lang="en-US" sz="2000" spc="-1" strike="noStrike">
                 <a:latin typeface="Arial"/>
               </a:rPr>
               <a:t>Seventh Outline Level</a:t>
             </a:r>
-            <a:endParaRPr b="0" lang="en-US" sz="1800" spc="-1" strike="noStrike">
+            <a:endParaRPr b="0" lang="en-US" sz="2000" spc="-1" strike="noStrike">
               <a:latin typeface="Arial"/>
             </a:endParaRPr>
           </a:p>
@@ -5596,7 +5581,7 @@
         <p:spPr>
           <a:xfrm>
             <a:off x="11242080" y="6450480"/>
-            <a:ext cx="355680" cy="223560"/>
+            <a:ext cx="355320" cy="223200"/>
           </a:xfrm>
           <a:prstGeom prst="rect">
             <a:avLst/>
@@ -5622,7 +5607,7 @@
                 <a:spcPct val="100000"/>
               </a:lnSpc>
             </a:pPr>
-            <a:fld id="{28989187-A496-42E8-AC52-10EFA347382C}" type="slidenum">
+            <a:fld id="{8D30D24D-4CC7-4317-8C3B-EE9BA7298E4A}" type="slidenum">
               <a:rPr b="0" lang="en-US" sz="1100" spc="-1" strike="noStrike">
                 <a:solidFill>
                   <a:srgbClr val="676a6e"/>
@@ -5647,7 +5632,7 @@
         <p:spPr>
           <a:xfrm>
             <a:off x="5135400" y="6581160"/>
-            <a:ext cx="1959480" cy="425880"/>
+            <a:ext cx="1959120" cy="425880"/>
           </a:xfrm>
           <a:prstGeom prst="rect">
             <a:avLst/>
@@ -5702,7 +5687,7 @@
         <p:spPr>
           <a:xfrm>
             <a:off x="3240" y="636480"/>
-            <a:ext cx="12191040" cy="85680"/>
+            <a:ext cx="12190680" cy="85320"/>
           </a:xfrm>
           <a:prstGeom prst="rect">
             <a:avLst/>
@@ -6023,7 +6008,7 @@
         <p:spPr>
           <a:xfrm>
             <a:off x="11242080" y="6450480"/>
-            <a:ext cx="355680" cy="223560"/>
+            <a:ext cx="355320" cy="223200"/>
           </a:xfrm>
           <a:prstGeom prst="rect">
             <a:avLst/>
@@ -6049,7 +6034,7 @@
                 <a:spcPct val="100000"/>
               </a:lnSpc>
             </a:pPr>
-            <a:fld id="{D36C1109-2282-40F1-922E-CC06FC9B9A54}" type="slidenum">
+            <a:fld id="{B06BFEB4-D62A-4DC5-B2A5-B90D540BDB8F}" type="slidenum">
               <a:rPr b="0" lang="en-US" sz="1100" spc="-1" strike="noStrike">
                 <a:solidFill>
                   <a:srgbClr val="676a6e"/>
@@ -6074,7 +6059,7 @@
         <p:spPr>
           <a:xfrm>
             <a:off x="5135400" y="6581160"/>
-            <a:ext cx="1959480" cy="425880"/>
+            <a:ext cx="1959120" cy="425880"/>
           </a:xfrm>
           <a:prstGeom prst="rect">
             <a:avLst/>
@@ -6129,7 +6114,7 @@
         <p:spPr>
           <a:xfrm>
             <a:off x="3240" y="636480"/>
-            <a:ext cx="12191040" cy="85680"/>
+            <a:ext cx="12190680" cy="85320"/>
           </a:xfrm>
           <a:prstGeom prst="rect">
             <a:avLst/>
@@ -6443,7 +6428,7 @@
         <p:spPr>
           <a:xfrm>
             <a:off x="820800" y="1778400"/>
-            <a:ext cx="10973880" cy="1775160"/>
+            <a:ext cx="10973520" cy="1774800"/>
           </a:xfrm>
           <a:prstGeom prst="rect">
             <a:avLst/>
@@ -6494,7 +6479,7 @@
         <p:spPr>
           <a:xfrm>
             <a:off x="820800" y="3641400"/>
-            <a:ext cx="5880960" cy="684360"/>
+            <a:ext cx="5880600" cy="684000"/>
           </a:xfrm>
           <a:prstGeom prst="rect">
             <a:avLst/>
@@ -6590,14 +6575,14 @@
       </p:grpSpPr>
       <p:sp>
         <p:nvSpPr>
-          <p:cNvPr id="168" name="CustomShape 1"/>
+          <p:cNvPr id="181" name="CustomShape 1"/>
           <p:cNvSpPr/>
           <p:nvPr/>
         </p:nvSpPr>
         <p:spPr>
           <a:xfrm>
             <a:off x="366840" y="113040"/>
-            <a:ext cx="11017800" cy="441360"/>
+            <a:ext cx="11017440" cy="441000"/>
           </a:xfrm>
           <a:prstGeom prst="rect">
             <a:avLst/>
@@ -6641,14 +6626,14 @@
       </p:sp>
       <p:sp>
         <p:nvSpPr>
-          <p:cNvPr id="169" name="CustomShape 2"/>
+          <p:cNvPr id="182" name="CustomShape 2"/>
           <p:cNvSpPr/>
           <p:nvPr/>
         </p:nvSpPr>
         <p:spPr>
           <a:xfrm>
             <a:off x="592920" y="6450480"/>
-            <a:ext cx="722880" cy="219240"/>
+            <a:ext cx="722520" cy="218880"/>
           </a:xfrm>
           <a:prstGeom prst="rect">
             <a:avLst/>
@@ -6692,14 +6677,14 @@
       </p:sp>
       <p:sp>
         <p:nvSpPr>
-          <p:cNvPr id="170" name="CustomShape 3"/>
+          <p:cNvPr id="183" name="CustomShape 3"/>
           <p:cNvSpPr/>
           <p:nvPr/>
         </p:nvSpPr>
         <p:spPr>
           <a:xfrm>
             <a:off x="1946520" y="6450480"/>
-            <a:ext cx="1145520" cy="219240"/>
+            <a:ext cx="1145160" cy="218880"/>
           </a:xfrm>
           <a:prstGeom prst="rect">
             <a:avLst/>
@@ -6743,7 +6728,7 @@
       </p:sp>
       <p:graphicFrame>
         <p:nvGraphicFramePr>
-          <p:cNvPr id="171" name="Table 4"/>
+          <p:cNvPr id="184" name="Table 4"/>
           <p:cNvGraphicFramePr/>
           <p:nvPr/>
         </p:nvGraphicFramePr>
@@ -6961,7 +6946,7 @@
       </p:graphicFrame>
       <p:pic>
         <p:nvPicPr>
-          <p:cNvPr id="172" name="" descr=""/>
+          <p:cNvPr id="185" name="" descr=""/>
           <p:cNvPicPr/>
           <p:nvPr/>
         </p:nvPicPr>
@@ -6972,7 +6957,7 @@
         <p:spPr>
           <a:xfrm>
             <a:off x="39240" y="1502640"/>
-            <a:ext cx="12191760" cy="3917880"/>
+            <a:ext cx="12191400" cy="3917520"/>
           </a:xfrm>
           <a:prstGeom prst="rect">
             <a:avLst/>
@@ -7014,14 +6999,14 @@
       </p:grpSpPr>
       <p:sp>
         <p:nvSpPr>
-          <p:cNvPr id="173" name="TextShape 1"/>
-          <p:cNvSpPr txBox="1"/>
+          <p:cNvPr id="186" name="CustomShape 1"/>
+          <p:cNvSpPr/>
           <p:nvPr/>
         </p:nvSpPr>
         <p:spPr>
           <a:xfrm>
             <a:off x="959400" y="1209240"/>
-            <a:ext cx="10562040" cy="4185720"/>
+            <a:ext cx="10561680" cy="4185360"/>
           </a:xfrm>
           <a:prstGeom prst="rect">
             <a:avLst/>
@@ -7031,70 +7016,314 @@
             <a:noFill/>
           </a:ln>
         </p:spPr>
+        <p:style>
+          <a:lnRef idx="0"/>
+          <a:fillRef idx="0"/>
+          <a:effectRef idx="0"/>
+          <a:fontRef idx="minor"/>
+        </p:style>
         <p:txBody>
           <a:bodyPr lIns="90000" rIns="90000" tIns="45000" bIns="45000">
             <a:noAutofit/>
           </a:bodyPr>
           <a:p>
+            <a:pPr>
+              <a:lnSpc>
+                <a:spcPct val="100000"/>
+              </a:lnSpc>
+            </a:pPr>
             <a:r>
               <a:rPr b="0" lang="en-US" sz="1800" spc="-1" strike="noStrike">
                 <a:latin typeface="Arial"/>
               </a:rPr>
-              <a:t>| Splitter     </a:t>
-            </a:r>
+              <a:t>| Splitter                         | Best For                                  | How It Works                                         |</a:t>
+            </a:r>
+            <a:endParaRPr b="0" lang="en-US" sz="1800" spc="-1" strike="noStrike">
+              <a:latin typeface="Arial"/>
+            </a:endParaRPr>
+          </a:p>
+          <a:p>
+            <a:pPr>
+              <a:lnSpc>
+                <a:spcPct val="100000"/>
+              </a:lnSpc>
+            </a:pPr>
             <a:r>
               <a:rPr b="0" lang="en-US" sz="1800" spc="-1" strike="noStrike">
                 <a:latin typeface="Arial"/>
               </a:rPr>
-              <a:t>                 </a:t>
-            </a:r>
+              <a:t>|----------------------------------|--------------------------------------------|------------------------------------------------------|</a:t>
+            </a:r>
+            <a:endParaRPr b="0" lang="en-US" sz="1800" spc="-1" strike="noStrike">
+              <a:latin typeface="Arial"/>
+            </a:endParaRPr>
+          </a:p>
+          <a:p>
+            <a:pPr>
+              <a:lnSpc>
+                <a:spcPct val="100000"/>
+              </a:lnSpc>
+            </a:pPr>
             <a:r>
               <a:rPr b="0" lang="en-US" sz="1800" spc="-1" strike="noStrike">
                 <a:latin typeface="Arial"/>
               </a:rPr>
-              <a:t>   | Best </a:t>
-            </a:r>
+              <a:t>| `RecursiveCharacterTextSplitter`| ✅ General-purpose (most used)             | Breaks text by paragraphs → sentences → chars        |</a:t>
+            </a:r>
+            <a:endParaRPr b="0" lang="en-US" sz="1800" spc="-1" strike="noStrike">
+              <a:latin typeface="Arial"/>
+            </a:endParaRPr>
+          </a:p>
+          <a:p>
+            <a:pPr>
+              <a:lnSpc>
+                <a:spcPct val="100000"/>
+              </a:lnSpc>
+            </a:pPr>
             <a:r>
               <a:rPr b="0" lang="en-US" sz="1800" spc="-1" strike="noStrike">
                 <a:latin typeface="Arial"/>
               </a:rPr>
-              <a:t>For            </a:t>
-            </a:r>
+              <a:t>| `CharacterTextSplitter`         | Simple, fast splitting                     | Splits only by fixed-size character chunks           |</a:t>
+            </a:r>
+            <a:endParaRPr b="0" lang="en-US" sz="1800" spc="-1" strike="noStrike">
+              <a:latin typeface="Arial"/>
+            </a:endParaRPr>
+          </a:p>
+          <a:p>
+            <a:pPr>
+              <a:lnSpc>
+                <a:spcPct val="100000"/>
+              </a:lnSpc>
+            </a:pPr>
             <a:r>
               <a:rPr b="0" lang="en-US" sz="1800" spc="-1" strike="noStrike">
                 <a:latin typeface="Arial"/>
               </a:rPr>
-              <a:t>                 </a:t>
-            </a:r>
+              <a:t>| `TokenTextSplitter`             | When you must control token limits         | Splits based on token count (e.g., for OpenAI LLMs)  |</a:t>
+            </a:r>
+            <a:endParaRPr b="0" lang="en-US" sz="1800" spc="-1" strike="noStrike">
+              <a:latin typeface="Arial"/>
+            </a:endParaRPr>
+          </a:p>
+          <a:p>
+            <a:pPr>
+              <a:lnSpc>
+                <a:spcPct val="100000"/>
+              </a:lnSpc>
+            </a:pPr>
             <a:r>
               <a:rPr b="0" lang="en-US" sz="1800" spc="-1" strike="noStrike">
                 <a:latin typeface="Arial"/>
               </a:rPr>
-              <a:t>     | How It </a:t>
-            </a:r>
+              <a:t>| `SpacyTextSplitter`             | Structurally correct sentence-based splits | Uses spaCy NLP for sentence-level chunking           |</a:t>
+            </a:r>
+            <a:endParaRPr b="0" lang="en-US" sz="1800" spc="-1" strike="noStrike">
+              <a:latin typeface="Arial"/>
+            </a:endParaRPr>
+          </a:p>
+          <a:p>
+            <a:pPr>
+              <a:lnSpc>
+                <a:spcPct val="100000"/>
+              </a:lnSpc>
+            </a:pPr>
             <a:r>
               <a:rPr b="0" lang="en-US" sz="1800" spc="-1" strike="noStrike">
                 <a:latin typeface="Arial"/>
               </a:rPr>
-              <a:t>Works        </a:t>
-            </a:r>
+              <a:t>| `MarkdownTextSplitter`          | Markdown docs (retain structure)           | Splits by headers, sections, and lines               |</a:t>
+            </a:r>
+            <a:endParaRPr b="0" lang="en-US" sz="1800" spc="-1" strike="noStrike">
+              <a:latin typeface="Arial"/>
+            </a:endParaRPr>
+          </a:p>
+          <a:p>
+            <a:pPr>
+              <a:lnSpc>
+                <a:spcPct val="100000"/>
+              </a:lnSpc>
+            </a:pPr>
             <a:r>
               <a:rPr b="0" lang="en-US" sz="1800" spc="-1" strike="noStrike">
                 <a:latin typeface="Arial"/>
               </a:rPr>
-              <a:t>                 </a:t>
-            </a:r>
+              <a:t>| `NLTKTextSplitter`              | Linguistically-aware chunking              | Sentence-level splitting using NLTK tokenizer        |</a:t>
+            </a:r>
+            <a:endParaRPr b="0" lang="en-US" sz="1800" spc="-1" strike="noStrike">
+              <a:latin typeface="Arial"/>
+            </a:endParaRPr>
+          </a:p>
+          <a:p>
+            <a:pPr>
+              <a:lnSpc>
+                <a:spcPct val="100000"/>
+              </a:lnSpc>
+            </a:pPr>
             <a:r>
               <a:rPr b="0" lang="en-US" sz="1800" spc="-1" strike="noStrike">
                 <a:latin typeface="Arial"/>
               </a:rPr>
-              <a:t>                </a:t>
-            </a:r>
+              <a:t>| `LanguageTextSplitter`          | Code documents                             | Splits by function, class, etc., using tree-sitter   |</a:t>
+            </a:r>
+            <a:endParaRPr b="0" lang="en-US" sz="1800" spc="-1" strike="noStrike">
+              <a:latin typeface="Arial"/>
+            </a:endParaRPr>
+          </a:p>
+        </p:txBody>
+      </p:sp>
+    </p:spTree>
+  </p:cSld>
+  <mc:AlternateContent>
+    <mc:Choice Requires="p14">
+      <p:transition spd="slow" p14:dur="2000"/>
+    </mc:Choice>
+    <mc:Fallback>
+      <p:transition spd="slow"/>
+    </mc:Fallback>
+  </mc:AlternateContent>
+</p:sld>
+</file>
+
+<file path=ppt/slides/slide12.xml><?xml version="1.0" encoding="utf-8"?>
+<p:sld xmlns:a="http://schemas.openxmlformats.org/drawingml/2006/main" xmlns:p="http://schemas.openxmlformats.org/presentationml/2006/main" xmlns:r="http://schemas.openxmlformats.org/officeDocument/2006/relationships" xmlns:p14="http://schemas.microsoft.com/office/powerpoint/2010/main" xmlns:p15="http://schemas.microsoft.com/office/powerpoint/2012/main" xmlns:mc="http://schemas.openxmlformats.org/markup-compatibility/2006">
+  <p:cSld>
+    <p:spTree>
+      <p:nvGrpSpPr>
+        <p:cNvPr id="1" name=""/>
+        <p:cNvGrpSpPr/>
+        <p:nvPr/>
+      </p:nvGrpSpPr>
+      <p:grpSpPr>
+        <a:xfrm>
+          <a:off x="0" y="0"/>
+          <a:ext cx="0" cy="0"/>
+          <a:chOff x="0" y="0"/>
+          <a:chExt cx="0" cy="0"/>
+        </a:xfrm>
+      </p:grpSpPr>
+      <p:pic>
+        <p:nvPicPr>
+          <p:cNvPr id="187" name="" descr=""/>
+          <p:cNvPicPr/>
+          <p:nvPr/>
+        </p:nvPicPr>
+        <p:blipFill>
+          <a:blip r:embed="rId1"/>
+          <a:stretch/>
+        </p:blipFill>
+        <p:spPr>
+          <a:xfrm>
+            <a:off x="1097280" y="1234800"/>
+            <a:ext cx="9927720" cy="4891680"/>
+          </a:xfrm>
+          <a:prstGeom prst="rect">
+            <a:avLst/>
+          </a:prstGeom>
+          <a:ln>
+            <a:noFill/>
+          </a:ln>
+        </p:spPr>
+      </p:pic>
+      <p:sp>
+        <p:nvSpPr>
+          <p:cNvPr id="188" name="TextShape 1"/>
+          <p:cNvSpPr txBox="1"/>
+          <p:nvPr/>
+        </p:nvSpPr>
+        <p:spPr>
+          <a:xfrm>
+            <a:off x="587520" y="91440"/>
+            <a:ext cx="5813280" cy="503640"/>
+          </a:xfrm>
+          <a:prstGeom prst="rect">
+            <a:avLst/>
+          </a:prstGeom>
+          <a:noFill/>
+          <a:ln>
+            <a:noFill/>
+          </a:ln>
+        </p:spPr>
+        <p:txBody>
+          <a:bodyPr lIns="90000" rIns="90000" tIns="45000" bIns="45000">
+            <a:noAutofit/>
+          </a:bodyPr>
+          <a:p>
+            <a:r>
+              <a:rPr b="0" lang="en-US" sz="2800" spc="-1" strike="noStrike">
+                <a:solidFill>
+                  <a:srgbClr val="00a3e0"/>
+                </a:solidFill>
+                <a:latin typeface="Trebuchet MS"/>
+                <a:ea typeface="DejaVu Sans"/>
+              </a:rPr>
+              <a:t>DuckDuckGoSearch Operators</a:t>
+            </a:r>
+            <a:endParaRPr b="0" lang="en-US" sz="2800" spc="-1" strike="noStrike">
+              <a:latin typeface="Arial"/>
+            </a:endParaRPr>
+          </a:p>
+        </p:txBody>
+      </p:sp>
+    </p:spTree>
+  </p:cSld>
+  <mc:AlternateContent>
+    <mc:Choice Requires="p14">
+      <p:transition spd="slow" p14:dur="2000"/>
+    </mc:Choice>
+    <mc:Fallback>
+      <p:transition spd="slow"/>
+    </mc:Fallback>
+  </mc:AlternateContent>
+</p:sld>
+</file>
+
+<file path=ppt/slides/slide13.xml><?xml version="1.0" encoding="utf-8"?>
+<p:sld xmlns:a="http://schemas.openxmlformats.org/drawingml/2006/main" xmlns:p="http://schemas.openxmlformats.org/presentationml/2006/main" xmlns:r="http://schemas.openxmlformats.org/officeDocument/2006/relationships" xmlns:p14="http://schemas.microsoft.com/office/powerpoint/2010/main" xmlns:p15="http://schemas.microsoft.com/office/powerpoint/2012/main" xmlns:mc="http://schemas.openxmlformats.org/markup-compatibility/2006">
+  <p:cSld>
+    <p:spTree>
+      <p:nvGrpSpPr>
+        <p:cNvPr id="1" name=""/>
+        <p:cNvGrpSpPr/>
+        <p:nvPr/>
+      </p:nvGrpSpPr>
+      <p:grpSpPr>
+        <a:xfrm>
+          <a:off x="0" y="0"/>
+          <a:ext cx="0" cy="0"/>
+          <a:chOff x="0" y="0"/>
+          <a:chExt cx="0" cy="0"/>
+        </a:xfrm>
+      </p:grpSpPr>
+      <p:sp>
+        <p:nvSpPr>
+          <p:cNvPr id="189" name="TextShape 1"/>
+          <p:cNvSpPr txBox="1"/>
+          <p:nvPr/>
+        </p:nvSpPr>
+        <p:spPr>
+          <a:xfrm>
+            <a:off x="640080" y="1386720"/>
+            <a:ext cx="10809000" cy="3825360"/>
+          </a:xfrm>
+          <a:prstGeom prst="rect">
+            <a:avLst/>
+          </a:prstGeom>
+          <a:noFill/>
+          <a:ln>
+            <a:noFill/>
+          </a:ln>
+        </p:spPr>
+        <p:txBody>
+          <a:bodyPr lIns="90000" rIns="90000" tIns="45000" bIns="45000">
+            <a:noAutofit/>
+          </a:bodyPr>
+          <a:p>
             <a:r>
               <a:rPr b="0" lang="en-US" sz="1800" spc="-1" strike="noStrike">
                 <a:latin typeface="Arial"/>
               </a:rPr>
-              <a:t>|</a:t>
+              <a:t>| Feature                  | ChatGPT-4o                       | LLaMA-2                                 |</a:t>
             </a:r>
             <a:endParaRPr b="0" lang="en-US" sz="1800" spc="-1" strike="noStrike">
               <a:latin typeface="Arial"/>
@@ -7105,722 +7334,115 @@
               <a:rPr b="0" lang="en-US" sz="1800" spc="-1" strike="noStrike">
                 <a:latin typeface="Arial"/>
               </a:rPr>
-              <a:t>|-------------</a:t>
-            </a:r>
+              <a:t>|--------------------------|----------------------------------|-----------------------------------------|</a:t>
+            </a:r>
+            <a:endParaRPr b="0" lang="en-US" sz="1800" spc="-1" strike="noStrike">
+              <a:latin typeface="Arial"/>
+            </a:endParaRPr>
+          </a:p>
+          <a:p>
             <a:r>
               <a:rPr b="0" lang="en-US" sz="1800" spc="-1" strike="noStrike">
                 <a:latin typeface="Arial"/>
               </a:rPr>
-              <a:t>--------------</a:t>
-            </a:r>
+              <a:t>| Open-source              | ❌ No                            | ✅ Yes (via request/license from Meta)   |</a:t>
+            </a:r>
+            <a:endParaRPr b="0" lang="en-US" sz="1800" spc="-1" strike="noStrike">
+              <a:latin typeface="Arial"/>
+            </a:endParaRPr>
+          </a:p>
+          <a:p>
             <a:r>
               <a:rPr b="0" lang="en-US" sz="1800" spc="-1" strike="noStrike">
                 <a:latin typeface="Arial"/>
               </a:rPr>
-              <a:t>-------|------</a:t>
-            </a:r>
+              <a:t>| Multimodal               | ✅ Yes (native text/image/audio) | ❌ No (text only by default)            |</a:t>
+            </a:r>
+            <a:endParaRPr b="0" lang="en-US" sz="1800" spc="-1" strike="noStrike">
+              <a:latin typeface="Arial"/>
+            </a:endParaRPr>
+          </a:p>
+          <a:p>
             <a:r>
               <a:rPr b="0" lang="en-US" sz="1800" spc="-1" strike="noStrike">
                 <a:latin typeface="Arial"/>
               </a:rPr>
-              <a:t>--------------</a:t>
-            </a:r>
+              <a:t>| Fine-tuning control      | ❌ Not user-controlled           | ✅ Can fine-tune (e.g. with LoRA)       |</a:t>
+            </a:r>
+            <a:endParaRPr b="0" lang="en-US" sz="1800" spc="-1" strike="noStrike">
+              <a:latin typeface="Arial"/>
+            </a:endParaRPr>
+          </a:p>
+          <a:p>
             <a:r>
               <a:rPr b="0" lang="en-US" sz="1800" spc="-1" strike="noStrike">
                 <a:latin typeface="Arial"/>
               </a:rPr>
-              <a:t>--------------</a:t>
-            </a:r>
+              <a:t>| API availability         | ✅ Yes (OpenAI API)              | ❌ No built-in API, self-hosted needed  |</a:t>
+            </a:r>
+            <a:endParaRPr b="0" lang="en-US" sz="1800" spc="-1" strike="noStrike">
+              <a:latin typeface="Arial"/>
+            </a:endParaRPr>
+          </a:p>
+          <a:p>
             <a:r>
               <a:rPr b="0" lang="en-US" sz="1800" spc="-1" strike="noStrike">
                 <a:latin typeface="Arial"/>
               </a:rPr>
-              <a:t>----------|---</a:t>
-            </a:r>
+              <a:t>| Instruction-tuned chat  | ✅ Yes                           | ✅ Yes (e.g. LLaMA-2-Chat)               |</a:t>
+            </a:r>
+            <a:endParaRPr b="0" lang="en-US" sz="1800" spc="-1" strike="noStrike">
+              <a:latin typeface="Arial"/>
+            </a:endParaRPr>
+          </a:p>
+          <a:p>
             <a:r>
               <a:rPr b="0" lang="en-US" sz="1800" spc="-1" strike="noStrike">
                 <a:latin typeface="Arial"/>
               </a:rPr>
-              <a:t>--------------</a:t>
-            </a:r>
-            <a:r>
-              <a:rPr b="0" lang="en-US" sz="1800" spc="-1" strike="noStrike">
-                <a:latin typeface="Arial"/>
-              </a:rPr>
-              <a:t>--------------</a:t>
-            </a:r>
-            <a:r>
-              <a:rPr b="0" lang="en-US" sz="1800" spc="-1" strike="noStrike">
-                <a:latin typeface="Arial"/>
-              </a:rPr>
-              <a:t>--------------</a:t>
-            </a:r>
-            <a:r>
-              <a:rPr b="0" lang="en-US" sz="1800" spc="-1" strike="noStrike">
-                <a:latin typeface="Arial"/>
-              </a:rPr>
-              <a:t>---------|</a:t>
+              <a:t>| Real-time inference      | ✅ Fast and efficient            | ⚠️ Depends on hardware &amp; quantization   |</a:t>
             </a:r>
             <a:endParaRPr b="0" lang="en-US" sz="1800" spc="-1" strike="noStrike">
               <a:latin typeface="Arial"/>
             </a:endParaRPr>
           </a:p>
-          <a:p>
-            <a:r>
-              <a:rPr b="0" lang="en-US" sz="1800" spc="-1" strike="noStrike">
-                <a:latin typeface="Arial"/>
-              </a:rPr>
-              <a:t>| </a:t>
-            </a:r>
-            <a:r>
-              <a:rPr b="0" lang="en-US" sz="1800" spc="-1" strike="noStrike">
-                <a:latin typeface="Arial"/>
-              </a:rPr>
-              <a:t>`Recursive</a:t>
-            </a:r>
-            <a:r>
-              <a:rPr b="0" lang="en-US" sz="1800" spc="-1" strike="noStrike">
-                <a:latin typeface="Arial"/>
-              </a:rPr>
-              <a:t>CharacterT</a:t>
-            </a:r>
-            <a:r>
-              <a:rPr b="0" lang="en-US" sz="1800" spc="-1" strike="noStrike">
-                <a:latin typeface="Arial"/>
-              </a:rPr>
-              <a:t>extSplitter`</a:t>
-            </a:r>
-            <a:r>
-              <a:rPr b="0" lang="en-US" sz="1800" spc="-1" strike="noStrike">
-                <a:latin typeface="Arial"/>
-              </a:rPr>
-              <a:t>| ✅ </a:t>
-            </a:r>
-            <a:r>
-              <a:rPr b="0" lang="en-US" sz="1800" spc="-1" strike="noStrike">
-                <a:latin typeface="Arial"/>
-              </a:rPr>
-              <a:t>General-</a:t>
-            </a:r>
-            <a:r>
-              <a:rPr b="0" lang="en-US" sz="1800" spc="-1" strike="noStrike">
-                <a:latin typeface="Arial"/>
-              </a:rPr>
-              <a:t>purpose </a:t>
-            </a:r>
-            <a:r>
-              <a:rPr b="0" lang="en-US" sz="1800" spc="-1" strike="noStrike">
-                <a:latin typeface="Arial"/>
-              </a:rPr>
-              <a:t>(most </a:t>
-            </a:r>
-            <a:r>
-              <a:rPr b="0" lang="en-US" sz="1800" spc="-1" strike="noStrike">
-                <a:latin typeface="Arial"/>
-              </a:rPr>
-              <a:t>used)         </a:t>
-            </a:r>
-            <a:r>
-              <a:rPr b="0" lang="en-US" sz="1800" spc="-1" strike="noStrike">
-                <a:latin typeface="Arial"/>
-              </a:rPr>
-              <a:t>    | Breaks </a:t>
-            </a:r>
-            <a:r>
-              <a:rPr b="0" lang="en-US" sz="1800" spc="-1" strike="noStrike">
-                <a:latin typeface="Arial"/>
-              </a:rPr>
-              <a:t>text by </a:t>
-            </a:r>
-            <a:r>
-              <a:rPr b="0" lang="en-US" sz="1800" spc="-1" strike="noStrike">
-                <a:latin typeface="Arial"/>
-              </a:rPr>
-              <a:t>paragraph</a:t>
-            </a:r>
-            <a:r>
-              <a:rPr b="0" lang="en-US" sz="1800" spc="-1" strike="noStrike">
-                <a:latin typeface="Arial"/>
-              </a:rPr>
-              <a:t>s → </a:t>
-            </a:r>
-            <a:r>
-              <a:rPr b="0" lang="en-US" sz="1800" spc="-1" strike="noStrike">
-                <a:latin typeface="Arial"/>
-              </a:rPr>
-              <a:t>sentences </a:t>
-            </a:r>
-            <a:r>
-              <a:rPr b="0" lang="en-US" sz="1800" spc="-1" strike="noStrike">
-                <a:latin typeface="Arial"/>
-              </a:rPr>
-              <a:t>→ chars    </a:t>
-            </a:r>
-            <a:r>
-              <a:rPr b="0" lang="en-US" sz="1800" spc="-1" strike="noStrike">
-                <a:latin typeface="Arial"/>
-              </a:rPr>
-              <a:t>    |</a:t>
-            </a:r>
-            <a:endParaRPr b="0" lang="en-US" sz="1800" spc="-1" strike="noStrike">
-              <a:latin typeface="Arial"/>
-            </a:endParaRPr>
-          </a:p>
-          <a:p>
-            <a:r>
-              <a:rPr b="0" lang="en-US" sz="1800" spc="-1" strike="noStrike">
-                <a:latin typeface="Arial"/>
-              </a:rPr>
-              <a:t>| </a:t>
-            </a:r>
-            <a:r>
-              <a:rPr b="0" lang="en-US" sz="1800" spc="-1" strike="noStrike">
-                <a:latin typeface="Arial"/>
-              </a:rPr>
-              <a:t>`Character</a:t>
-            </a:r>
-            <a:r>
-              <a:rPr b="0" lang="en-US" sz="1800" spc="-1" strike="noStrike">
-                <a:latin typeface="Arial"/>
-              </a:rPr>
-              <a:t>TextSplitte</a:t>
-            </a:r>
-            <a:r>
-              <a:rPr b="0" lang="en-US" sz="1800" spc="-1" strike="noStrike">
-                <a:latin typeface="Arial"/>
-              </a:rPr>
-              <a:t>r`         | </a:t>
-            </a:r>
-            <a:r>
-              <a:rPr b="0" lang="en-US" sz="1800" spc="-1" strike="noStrike">
-                <a:latin typeface="Arial"/>
-              </a:rPr>
-              <a:t>Simple, </a:t>
-            </a:r>
-            <a:r>
-              <a:rPr b="0" lang="en-US" sz="1800" spc="-1" strike="noStrike">
-                <a:latin typeface="Arial"/>
-              </a:rPr>
-              <a:t>fast </a:t>
-            </a:r>
-            <a:r>
-              <a:rPr b="0" lang="en-US" sz="1800" spc="-1" strike="noStrike">
-                <a:latin typeface="Arial"/>
-              </a:rPr>
-              <a:t>splitting      </a:t>
-            </a:r>
-            <a:r>
-              <a:rPr b="0" lang="en-US" sz="1800" spc="-1" strike="noStrike">
-                <a:latin typeface="Arial"/>
-              </a:rPr>
-              <a:t>               | </a:t>
-            </a:r>
-            <a:r>
-              <a:rPr b="0" lang="en-US" sz="1800" spc="-1" strike="noStrike">
-                <a:latin typeface="Arial"/>
-              </a:rPr>
-              <a:t>Splits only </a:t>
-            </a:r>
-            <a:r>
-              <a:rPr b="0" lang="en-US" sz="1800" spc="-1" strike="noStrike">
-                <a:latin typeface="Arial"/>
-              </a:rPr>
-              <a:t>by fixed-</a:t>
-            </a:r>
-            <a:r>
-              <a:rPr b="0" lang="en-US" sz="1800" spc="-1" strike="noStrike">
-                <a:latin typeface="Arial"/>
-              </a:rPr>
-              <a:t>size </a:t>
-            </a:r>
-            <a:r>
-              <a:rPr b="0" lang="en-US" sz="1800" spc="-1" strike="noStrike">
-                <a:latin typeface="Arial"/>
-              </a:rPr>
-              <a:t>character </a:t>
-            </a:r>
-            <a:r>
-              <a:rPr b="0" lang="en-US" sz="1800" spc="-1" strike="noStrike">
-                <a:latin typeface="Arial"/>
-              </a:rPr>
-              <a:t>chunks      </a:t>
-            </a:r>
-            <a:r>
-              <a:rPr b="0" lang="en-US" sz="1800" spc="-1" strike="noStrike">
-                <a:latin typeface="Arial"/>
-              </a:rPr>
-              <a:t>     |</a:t>
-            </a:r>
-            <a:endParaRPr b="0" lang="en-US" sz="1800" spc="-1" strike="noStrike">
-              <a:latin typeface="Arial"/>
-            </a:endParaRPr>
-          </a:p>
-          <a:p>
-            <a:r>
-              <a:rPr b="0" lang="en-US" sz="1800" spc="-1" strike="noStrike">
-                <a:latin typeface="Arial"/>
-              </a:rPr>
-              <a:t>| </a:t>
-            </a:r>
-            <a:r>
-              <a:rPr b="0" lang="en-US" sz="1800" spc="-1" strike="noStrike">
-                <a:latin typeface="Arial"/>
-              </a:rPr>
-              <a:t>`TokenText</a:t>
-            </a:r>
-            <a:r>
-              <a:rPr b="0" lang="en-US" sz="1800" spc="-1" strike="noStrike">
-                <a:latin typeface="Arial"/>
-              </a:rPr>
-              <a:t>Splitter`     </a:t>
-            </a:r>
-            <a:r>
-              <a:rPr b="0" lang="en-US" sz="1800" spc="-1" strike="noStrike">
-                <a:latin typeface="Arial"/>
-              </a:rPr>
-              <a:t>        | </a:t>
-            </a:r>
-            <a:r>
-              <a:rPr b="0" lang="en-US" sz="1800" spc="-1" strike="noStrike">
-                <a:latin typeface="Arial"/>
-              </a:rPr>
-              <a:t>When you </a:t>
-            </a:r>
-            <a:r>
-              <a:rPr b="0" lang="en-US" sz="1800" spc="-1" strike="noStrike">
-                <a:latin typeface="Arial"/>
-              </a:rPr>
-              <a:t>must </a:t>
-            </a:r>
-            <a:r>
-              <a:rPr b="0" lang="en-US" sz="1800" spc="-1" strike="noStrike">
-                <a:latin typeface="Arial"/>
-              </a:rPr>
-              <a:t>control </a:t>
-            </a:r>
-            <a:r>
-              <a:rPr b="0" lang="en-US" sz="1800" spc="-1" strike="noStrike">
-                <a:latin typeface="Arial"/>
-              </a:rPr>
-              <a:t>token </a:t>
-            </a:r>
-            <a:r>
-              <a:rPr b="0" lang="en-US" sz="1800" spc="-1" strike="noStrike">
-                <a:latin typeface="Arial"/>
-              </a:rPr>
-              <a:t>limits         </a:t>
-            </a:r>
-            <a:r>
-              <a:rPr b="0" lang="en-US" sz="1800" spc="-1" strike="noStrike">
-                <a:latin typeface="Arial"/>
-              </a:rPr>
-              <a:t>| Splits </a:t>
-            </a:r>
-            <a:r>
-              <a:rPr b="0" lang="en-US" sz="1800" spc="-1" strike="noStrike">
-                <a:latin typeface="Arial"/>
-              </a:rPr>
-              <a:t>based on </a:t>
-            </a:r>
-            <a:r>
-              <a:rPr b="0" lang="en-US" sz="1800" spc="-1" strike="noStrike">
-                <a:latin typeface="Arial"/>
-              </a:rPr>
-              <a:t>token </a:t>
-            </a:r>
-            <a:r>
-              <a:rPr b="0" lang="en-US" sz="1800" spc="-1" strike="noStrike">
-                <a:latin typeface="Arial"/>
-              </a:rPr>
-              <a:t>count </a:t>
-            </a:r>
-            <a:r>
-              <a:rPr b="0" lang="en-US" sz="1800" spc="-1" strike="noStrike">
-                <a:latin typeface="Arial"/>
-              </a:rPr>
-              <a:t>(e.g., for </a:t>
-            </a:r>
-            <a:r>
-              <a:rPr b="0" lang="en-US" sz="1800" spc="-1" strike="noStrike">
-                <a:latin typeface="Arial"/>
-              </a:rPr>
-              <a:t>OpenAI </a:t>
-            </a:r>
-            <a:r>
-              <a:rPr b="0" lang="en-US" sz="1800" spc="-1" strike="noStrike">
-                <a:latin typeface="Arial"/>
-              </a:rPr>
-              <a:t>LLMs)  |</a:t>
-            </a:r>
-            <a:endParaRPr b="0" lang="en-US" sz="1800" spc="-1" strike="noStrike">
-              <a:latin typeface="Arial"/>
-            </a:endParaRPr>
-          </a:p>
-          <a:p>
-            <a:r>
-              <a:rPr b="0" lang="en-US" sz="1800" spc="-1" strike="noStrike">
-                <a:latin typeface="Arial"/>
-              </a:rPr>
-              <a:t>| </a:t>
-            </a:r>
-            <a:r>
-              <a:rPr b="0" lang="en-US" sz="1800" spc="-1" strike="noStrike">
-                <a:latin typeface="Arial"/>
-              </a:rPr>
-              <a:t>`SpacyTex</a:t>
-            </a:r>
-            <a:r>
-              <a:rPr b="0" lang="en-US" sz="1800" spc="-1" strike="noStrike">
-                <a:latin typeface="Arial"/>
-              </a:rPr>
-              <a:t>tSplitter`    </a:t>
-            </a:r>
-            <a:r>
-              <a:rPr b="0" lang="en-US" sz="1800" spc="-1" strike="noStrike">
-                <a:latin typeface="Arial"/>
-              </a:rPr>
-              <a:t>         | </a:t>
-            </a:r>
-            <a:r>
-              <a:rPr b="0" lang="en-US" sz="1800" spc="-1" strike="noStrike">
-                <a:latin typeface="Arial"/>
-              </a:rPr>
-              <a:t>Structurall</a:t>
-            </a:r>
-            <a:r>
-              <a:rPr b="0" lang="en-US" sz="1800" spc="-1" strike="noStrike">
-                <a:latin typeface="Arial"/>
-              </a:rPr>
-              <a:t>y correct </a:t>
-            </a:r>
-            <a:r>
-              <a:rPr b="0" lang="en-US" sz="1800" spc="-1" strike="noStrike">
-                <a:latin typeface="Arial"/>
-              </a:rPr>
-              <a:t>sentence-</a:t>
-            </a:r>
-            <a:r>
-              <a:rPr b="0" lang="en-US" sz="1800" spc="-1" strike="noStrike">
-                <a:latin typeface="Arial"/>
-              </a:rPr>
-              <a:t>based </a:t>
-            </a:r>
-            <a:r>
-              <a:rPr b="0" lang="en-US" sz="1800" spc="-1" strike="noStrike">
-                <a:latin typeface="Arial"/>
-              </a:rPr>
-              <a:t>splits | </a:t>
-            </a:r>
-            <a:r>
-              <a:rPr b="0" lang="en-US" sz="1800" spc="-1" strike="noStrike">
-                <a:latin typeface="Arial"/>
-              </a:rPr>
-              <a:t>Uses </a:t>
-            </a:r>
-            <a:r>
-              <a:rPr b="0" lang="en-US" sz="1800" spc="-1" strike="noStrike">
-                <a:latin typeface="Arial"/>
-              </a:rPr>
-              <a:t>spaCy </a:t>
-            </a:r>
-            <a:r>
-              <a:rPr b="0" lang="en-US" sz="1800" spc="-1" strike="noStrike">
-                <a:latin typeface="Arial"/>
-              </a:rPr>
-              <a:t>NLP for </a:t>
-            </a:r>
-            <a:r>
-              <a:rPr b="0" lang="en-US" sz="1800" spc="-1" strike="noStrike">
-                <a:latin typeface="Arial"/>
-              </a:rPr>
-              <a:t>sentence-</a:t>
-            </a:r>
-            <a:r>
-              <a:rPr b="0" lang="en-US" sz="1800" spc="-1" strike="noStrike">
-                <a:latin typeface="Arial"/>
-              </a:rPr>
-              <a:t>level </a:t>
-            </a:r>
-            <a:r>
-              <a:rPr b="0" lang="en-US" sz="1800" spc="-1" strike="noStrike">
-                <a:latin typeface="Arial"/>
-              </a:rPr>
-              <a:t>chunking    </a:t>
-            </a:r>
-            <a:r>
-              <a:rPr b="0" lang="en-US" sz="1800" spc="-1" strike="noStrike">
-                <a:latin typeface="Arial"/>
-              </a:rPr>
-              <a:t>       |</a:t>
-            </a:r>
-            <a:endParaRPr b="0" lang="en-US" sz="1800" spc="-1" strike="noStrike">
-              <a:latin typeface="Arial"/>
-            </a:endParaRPr>
-          </a:p>
-          <a:p>
-            <a:r>
-              <a:rPr b="0" lang="en-US" sz="1800" spc="-1" strike="noStrike">
-                <a:latin typeface="Arial"/>
-              </a:rPr>
-              <a:t>| </a:t>
-            </a:r>
-            <a:r>
-              <a:rPr b="0" lang="en-US" sz="1800" spc="-1" strike="noStrike">
-                <a:latin typeface="Arial"/>
-              </a:rPr>
-              <a:t>`Markdow</a:t>
-            </a:r>
-            <a:r>
-              <a:rPr b="0" lang="en-US" sz="1800" spc="-1" strike="noStrike">
-                <a:latin typeface="Arial"/>
-              </a:rPr>
-              <a:t>nTextSplitt</a:t>
-            </a:r>
-            <a:r>
-              <a:rPr b="0" lang="en-US" sz="1800" spc="-1" strike="noStrike">
-                <a:latin typeface="Arial"/>
-              </a:rPr>
-              <a:t>er`          | </a:t>
-            </a:r>
-            <a:r>
-              <a:rPr b="0" lang="en-US" sz="1800" spc="-1" strike="noStrike">
-                <a:latin typeface="Arial"/>
-              </a:rPr>
-              <a:t>Markdown </a:t>
-            </a:r>
-            <a:r>
-              <a:rPr b="0" lang="en-US" sz="1800" spc="-1" strike="noStrike">
-                <a:latin typeface="Arial"/>
-              </a:rPr>
-              <a:t>docs </a:t>
-            </a:r>
-            <a:r>
-              <a:rPr b="0" lang="en-US" sz="1800" spc="-1" strike="noStrike">
-                <a:latin typeface="Arial"/>
-              </a:rPr>
-              <a:t>(retain </a:t>
-            </a:r>
-            <a:r>
-              <a:rPr b="0" lang="en-US" sz="1800" spc="-1" strike="noStrike">
-                <a:latin typeface="Arial"/>
-              </a:rPr>
-              <a:t>structure)   </a:t>
-            </a:r>
-            <a:r>
-              <a:rPr b="0" lang="en-US" sz="1800" spc="-1" strike="noStrike">
-                <a:latin typeface="Arial"/>
-              </a:rPr>
-              <a:t>        | </a:t>
-            </a:r>
-            <a:r>
-              <a:rPr b="0" lang="en-US" sz="1800" spc="-1" strike="noStrike">
-                <a:latin typeface="Arial"/>
-              </a:rPr>
-              <a:t>Splits by </a:t>
-            </a:r>
-            <a:r>
-              <a:rPr b="0" lang="en-US" sz="1800" spc="-1" strike="noStrike">
-                <a:latin typeface="Arial"/>
-              </a:rPr>
-              <a:t>headers, </a:t>
-            </a:r>
-            <a:r>
-              <a:rPr b="0" lang="en-US" sz="1800" spc="-1" strike="noStrike">
-                <a:latin typeface="Arial"/>
-              </a:rPr>
-              <a:t>sections, </a:t>
-            </a:r>
-            <a:r>
-              <a:rPr b="0" lang="en-US" sz="1800" spc="-1" strike="noStrike">
-                <a:latin typeface="Arial"/>
-              </a:rPr>
-              <a:t>and lines    </a:t>
-            </a:r>
-            <a:r>
-              <a:rPr b="0" lang="en-US" sz="1800" spc="-1" strike="noStrike">
-                <a:latin typeface="Arial"/>
-              </a:rPr>
-              <a:t>           |</a:t>
-            </a:r>
-            <a:endParaRPr b="0" lang="en-US" sz="1800" spc="-1" strike="noStrike">
-              <a:latin typeface="Arial"/>
-            </a:endParaRPr>
-          </a:p>
-          <a:p>
-            <a:r>
-              <a:rPr b="0" lang="en-US" sz="1800" spc="-1" strike="noStrike">
-                <a:latin typeface="Arial"/>
-              </a:rPr>
-              <a:t>| </a:t>
-            </a:r>
-            <a:r>
-              <a:rPr b="0" lang="en-US" sz="1800" spc="-1" strike="noStrike">
-                <a:latin typeface="Arial"/>
-              </a:rPr>
-              <a:t>`NLTKText</a:t>
-            </a:r>
-            <a:r>
-              <a:rPr b="0" lang="en-US" sz="1800" spc="-1" strike="noStrike">
-                <a:latin typeface="Arial"/>
-              </a:rPr>
-              <a:t>Splitter`     </a:t>
-            </a:r>
-            <a:r>
-              <a:rPr b="0" lang="en-US" sz="1800" spc="-1" strike="noStrike">
-                <a:latin typeface="Arial"/>
-              </a:rPr>
-              <a:t>         | </a:t>
-            </a:r>
-            <a:r>
-              <a:rPr b="0" lang="en-US" sz="1800" spc="-1" strike="noStrike">
-                <a:latin typeface="Arial"/>
-              </a:rPr>
-              <a:t>Linguistical</a:t>
-            </a:r>
-            <a:r>
-              <a:rPr b="0" lang="en-US" sz="1800" spc="-1" strike="noStrike">
-                <a:latin typeface="Arial"/>
-              </a:rPr>
-              <a:t>ly-aware </a:t>
-            </a:r>
-            <a:r>
-              <a:rPr b="0" lang="en-US" sz="1800" spc="-1" strike="noStrike">
-                <a:latin typeface="Arial"/>
-              </a:rPr>
-              <a:t>chunking    </a:t>
-            </a:r>
-            <a:r>
-              <a:rPr b="0" lang="en-US" sz="1800" spc="-1" strike="noStrike">
-                <a:latin typeface="Arial"/>
-              </a:rPr>
-              <a:t>          | </a:t>
-            </a:r>
-            <a:r>
-              <a:rPr b="0" lang="en-US" sz="1800" spc="-1" strike="noStrike">
-                <a:latin typeface="Arial"/>
-              </a:rPr>
-              <a:t>Sentence-</a:t>
-            </a:r>
-            <a:r>
-              <a:rPr b="0" lang="en-US" sz="1800" spc="-1" strike="noStrike">
-                <a:latin typeface="Arial"/>
-              </a:rPr>
-              <a:t>level </a:t>
-            </a:r>
-            <a:r>
-              <a:rPr b="0" lang="en-US" sz="1800" spc="-1" strike="noStrike">
-                <a:latin typeface="Arial"/>
-              </a:rPr>
-              <a:t>splitting </a:t>
-            </a:r>
-            <a:r>
-              <a:rPr b="0" lang="en-US" sz="1800" spc="-1" strike="noStrike">
-                <a:latin typeface="Arial"/>
-              </a:rPr>
-              <a:t>using </a:t>
-            </a:r>
-            <a:r>
-              <a:rPr b="0" lang="en-US" sz="1800" spc="-1" strike="noStrike">
-                <a:latin typeface="Arial"/>
-              </a:rPr>
-              <a:t>NLTK </a:t>
-            </a:r>
-            <a:r>
-              <a:rPr b="0" lang="en-US" sz="1800" spc="-1" strike="noStrike">
-                <a:latin typeface="Arial"/>
-              </a:rPr>
-              <a:t>tokenizer   </a:t>
-            </a:r>
-            <a:r>
-              <a:rPr b="0" lang="en-US" sz="1800" spc="-1" strike="noStrike">
-                <a:latin typeface="Arial"/>
-              </a:rPr>
-              <a:t>     |</a:t>
-            </a:r>
-            <a:endParaRPr b="0" lang="en-US" sz="1800" spc="-1" strike="noStrike">
-              <a:latin typeface="Arial"/>
-            </a:endParaRPr>
-          </a:p>
-          <a:p>
-            <a:r>
-              <a:rPr b="0" lang="en-US" sz="1800" spc="-1" strike="noStrike">
-                <a:latin typeface="Arial"/>
-              </a:rPr>
-              <a:t>| </a:t>
-            </a:r>
-            <a:r>
-              <a:rPr b="0" lang="en-US" sz="1800" spc="-1" strike="noStrike">
-                <a:latin typeface="Arial"/>
-              </a:rPr>
-              <a:t>`Language</a:t>
-            </a:r>
-            <a:r>
-              <a:rPr b="0" lang="en-US" sz="1800" spc="-1" strike="noStrike">
-                <a:latin typeface="Arial"/>
-              </a:rPr>
-              <a:t>TextSplitte</a:t>
-            </a:r>
-            <a:r>
-              <a:rPr b="0" lang="en-US" sz="1800" spc="-1" strike="noStrike">
-                <a:latin typeface="Arial"/>
-              </a:rPr>
-              <a:t>r`          | </a:t>
-            </a:r>
-            <a:r>
-              <a:rPr b="0" lang="en-US" sz="1800" spc="-1" strike="noStrike">
-                <a:latin typeface="Arial"/>
-              </a:rPr>
-              <a:t>Code </a:t>
-            </a:r>
-            <a:r>
-              <a:rPr b="0" lang="en-US" sz="1800" spc="-1" strike="noStrike">
-                <a:latin typeface="Arial"/>
-              </a:rPr>
-              <a:t>documents </a:t>
-            </a:r>
-            <a:r>
-              <a:rPr b="0" lang="en-US" sz="1800" spc="-1" strike="noStrike">
-                <a:latin typeface="Arial"/>
-              </a:rPr>
-              <a:t>                 </a:t>
-            </a:r>
-            <a:r>
-              <a:rPr b="0" lang="en-US" sz="1800" spc="-1" strike="noStrike">
-                <a:latin typeface="Arial"/>
-              </a:rPr>
-              <a:t>           | </a:t>
-            </a:r>
-            <a:r>
-              <a:rPr b="0" lang="en-US" sz="1800" spc="-1" strike="noStrike">
-                <a:latin typeface="Arial"/>
-              </a:rPr>
-              <a:t>Splits by </a:t>
-            </a:r>
-            <a:r>
-              <a:rPr b="0" lang="en-US" sz="1800" spc="-1" strike="noStrike">
-                <a:latin typeface="Arial"/>
-              </a:rPr>
-              <a:t>function, </a:t>
-            </a:r>
-            <a:r>
-              <a:rPr b="0" lang="en-US" sz="1800" spc="-1" strike="noStrike">
-                <a:latin typeface="Arial"/>
-              </a:rPr>
-              <a:t>class, etc., </a:t>
-            </a:r>
-            <a:r>
-              <a:rPr b="0" lang="en-US" sz="1800" spc="-1" strike="noStrike">
-                <a:latin typeface="Arial"/>
-              </a:rPr>
-              <a:t>using tree-</a:t>
-            </a:r>
-            <a:r>
-              <a:rPr b="0" lang="en-US" sz="1800" spc="-1" strike="noStrike">
-                <a:latin typeface="Arial"/>
-              </a:rPr>
-              <a:t>sitter   |</a:t>
-            </a:r>
-            <a:endParaRPr b="0" lang="en-US" sz="1800" spc="-1" strike="noStrike">
+        </p:txBody>
+      </p:sp>
+      <p:sp>
+        <p:nvSpPr>
+          <p:cNvPr id="190" name="TextShape 2"/>
+          <p:cNvSpPr txBox="1"/>
+          <p:nvPr/>
+        </p:nvSpPr>
+        <p:spPr>
+          <a:xfrm>
+            <a:off x="587520" y="91800"/>
+            <a:ext cx="11482560" cy="916200"/>
+          </a:xfrm>
+          <a:prstGeom prst="rect">
+            <a:avLst/>
+          </a:prstGeom>
+          <a:noFill/>
+          <a:ln>
+            <a:noFill/>
+          </a:ln>
+        </p:spPr>
+        <p:txBody>
+          <a:bodyPr lIns="90000" rIns="90000" tIns="45000" bIns="45000">
+            <a:noAutofit/>
+          </a:bodyPr>
+          <a:p>
+            <a:r>
+              <a:rPr b="0" lang="en-US" sz="2800" spc="-1" strike="noStrike">
+                <a:solidFill>
+                  <a:srgbClr val="00a3e0"/>
+                </a:solidFill>
+                <a:latin typeface="Trebuchet MS"/>
+                <a:ea typeface="DejaVu Sans"/>
+              </a:rPr>
+              <a:t>Pros and Cons Between ChatGPT and LLaMA</a:t>
+            </a:r>
+            <a:endParaRPr b="0" lang="en-US" sz="2800" spc="-1" strike="noStrike">
               <a:latin typeface="Arial"/>
             </a:endParaRPr>
           </a:p>
@@ -7865,7 +7487,7 @@
         <p:spPr>
           <a:xfrm>
             <a:off x="251280" y="67680"/>
-            <a:ext cx="11017800" cy="441360"/>
+            <a:ext cx="11017440" cy="441000"/>
           </a:xfrm>
           <a:prstGeom prst="rect">
             <a:avLst/>
@@ -7916,7 +7538,7 @@
         <p:spPr>
           <a:xfrm>
             <a:off x="781920" y="1083960"/>
-            <a:ext cx="10978560" cy="3441240"/>
+            <a:ext cx="10978200" cy="3441240"/>
           </a:xfrm>
           <a:prstGeom prst="rect">
             <a:avLst/>
@@ -7937,7 +7559,7 @@
             <a:spAutoFit/>
           </a:bodyPr>
           <a:p>
-            <a:pPr marL="216000" indent="-215280">
+            <a:pPr marL="216000" indent="-214920">
               <a:lnSpc>
                 <a:spcPct val="200000"/>
               </a:lnSpc>
@@ -7972,7 +7594,7 @@
             </a:endParaRPr>
           </a:p>
           <a:p>
-            <a:pPr marL="216000" indent="-215280">
+            <a:pPr marL="216000" indent="-214920">
               <a:lnSpc>
                 <a:spcPct val="200000"/>
               </a:lnSpc>
@@ -8007,7 +7629,7 @@
             </a:endParaRPr>
           </a:p>
           <a:p>
-            <a:pPr marL="216000" indent="-215280">
+            <a:pPr marL="216000" indent="-214920">
               <a:lnSpc>
                 <a:spcPct val="200000"/>
               </a:lnSpc>
@@ -8042,7 +7664,7 @@
             </a:endParaRPr>
           </a:p>
           <a:p>
-            <a:pPr marL="216000" indent="-215280">
+            <a:pPr marL="216000" indent="-214920">
               <a:lnSpc>
                 <a:spcPct val="200000"/>
               </a:lnSpc>
@@ -8077,7 +7699,7 @@
             </a:endParaRPr>
           </a:p>
           <a:p>
-            <a:pPr marL="216000" indent="-215280">
+            <a:pPr marL="216000" indent="-214920">
               <a:lnSpc>
                 <a:spcPct val="200000"/>
               </a:lnSpc>
@@ -8152,7 +7774,7 @@
         <p:spPr>
           <a:xfrm>
             <a:off x="251280" y="67680"/>
-            <a:ext cx="11017800" cy="441360"/>
+            <a:ext cx="11017440" cy="441000"/>
           </a:xfrm>
           <a:prstGeom prst="rect">
             <a:avLst/>
@@ -8207,7 +7829,7 @@
         <p:spPr>
           <a:xfrm>
             <a:off x="335520" y="829080"/>
-            <a:ext cx="11702520" cy="3664080"/>
+            <a:ext cx="11702160" cy="3663720"/>
           </a:xfrm>
           <a:prstGeom prst="rect">
             <a:avLst/>
@@ -8226,7 +7848,7 @@
         <p:spPr>
           <a:xfrm>
             <a:off x="749160" y="4664880"/>
-            <a:ext cx="11245680" cy="1597320"/>
+            <a:ext cx="11245320" cy="1597320"/>
           </a:xfrm>
           <a:prstGeom prst="rect">
             <a:avLst/>
@@ -8377,7 +7999,7 @@
         <p:spPr>
           <a:xfrm>
             <a:off x="251280" y="67680"/>
-            <a:ext cx="11017800" cy="441360"/>
+            <a:ext cx="11017440" cy="441000"/>
           </a:xfrm>
           <a:prstGeom prst="rect">
             <a:avLst/>
@@ -8428,7 +8050,7 @@
         <p:spPr>
           <a:xfrm>
             <a:off x="806040" y="1262160"/>
-            <a:ext cx="10811520" cy="3441240"/>
+            <a:ext cx="10811160" cy="3441240"/>
           </a:xfrm>
           <a:prstGeom prst="rect">
             <a:avLst/>
@@ -8449,7 +8071,7 @@
             <a:spAutoFit/>
           </a:bodyPr>
           <a:p>
-            <a:pPr marL="216000" indent="-215280">
+            <a:pPr marL="216000" indent="-214920">
               <a:lnSpc>
                 <a:spcPct val="200000"/>
               </a:lnSpc>
@@ -8484,7 +8106,7 @@
             </a:endParaRPr>
           </a:p>
           <a:p>
-            <a:pPr marL="216000" indent="-215280">
+            <a:pPr marL="216000" indent="-214920">
               <a:lnSpc>
                 <a:spcPct val="200000"/>
               </a:lnSpc>
@@ -8519,7 +8141,7 @@
             </a:endParaRPr>
           </a:p>
           <a:p>
-            <a:pPr marL="216000" indent="-215280">
+            <a:pPr marL="216000" indent="-214920">
               <a:lnSpc>
                 <a:spcPct val="200000"/>
               </a:lnSpc>
@@ -8554,7 +8176,7 @@
             </a:endParaRPr>
           </a:p>
           <a:p>
-            <a:pPr marL="216000" indent="-215280">
+            <a:pPr marL="216000" indent="-214920">
               <a:lnSpc>
                 <a:spcPct val="200000"/>
               </a:lnSpc>
@@ -8629,7 +8251,7 @@
         <p:spPr>
           <a:xfrm>
             <a:off x="422280" y="72720"/>
-            <a:ext cx="11017800" cy="441360"/>
+            <a:ext cx="11017440" cy="441000"/>
           </a:xfrm>
           <a:prstGeom prst="rect">
             <a:avLst/>
@@ -8680,7 +8302,7 @@
         <p:spPr>
           <a:xfrm>
             <a:off x="592920" y="6450480"/>
-            <a:ext cx="722880" cy="219240"/>
+            <a:ext cx="722520" cy="218880"/>
           </a:xfrm>
           <a:prstGeom prst="rect">
             <a:avLst/>
@@ -8731,7 +8353,7 @@
         <p:spPr>
           <a:xfrm>
             <a:off x="1946520" y="6450480"/>
-            <a:ext cx="1145520" cy="219240"/>
+            <a:ext cx="1145160" cy="218880"/>
           </a:xfrm>
           <a:prstGeom prst="rect">
             <a:avLst/>
@@ -9369,7 +8991,7 @@
         <p:spPr>
           <a:xfrm>
             <a:off x="592920" y="1480320"/>
-            <a:ext cx="11017800" cy="4565520"/>
+            <a:ext cx="11017440" cy="4565160"/>
           </a:xfrm>
           <a:prstGeom prst="rect">
             <a:avLst/>
@@ -9390,7 +9012,7 @@
             <a:noAutofit/>
           </a:bodyPr>
           <a:p>
-            <a:pPr marL="230040" indent="-228960">
+            <a:pPr marL="230040" indent="-228600">
               <a:lnSpc>
                 <a:spcPct val="100000"/>
               </a:lnSpc>
@@ -9418,7 +9040,7 @@
             </a:endParaRPr>
           </a:p>
           <a:p>
-            <a:pPr marL="230040" indent="-228960">
+            <a:pPr marL="230040" indent="-228600">
               <a:lnSpc>
                 <a:spcPct val="100000"/>
               </a:lnSpc>
@@ -9446,7 +9068,7 @@
             </a:endParaRPr>
           </a:p>
           <a:p>
-            <a:pPr marL="230040" indent="-228960">
+            <a:pPr marL="230040" indent="-228600">
               <a:lnSpc>
                 <a:spcPct val="100000"/>
               </a:lnSpc>
@@ -9474,7 +9096,7 @@
             </a:endParaRPr>
           </a:p>
           <a:p>
-            <a:pPr marL="230040" indent="-228960">
+            <a:pPr marL="230040" indent="-228600">
               <a:lnSpc>
                 <a:spcPct val="100000"/>
               </a:lnSpc>
@@ -9502,7 +9124,7 @@
             </a:endParaRPr>
           </a:p>
           <a:p>
-            <a:pPr marL="230040" indent="-228960">
+            <a:pPr marL="230040" indent="-228600">
               <a:lnSpc>
                 <a:spcPct val="100000"/>
               </a:lnSpc>
@@ -9540,7 +9162,7 @@
         <p:spPr>
           <a:xfrm>
             <a:off x="366840" y="113040"/>
-            <a:ext cx="11017800" cy="441360"/>
+            <a:ext cx="11017440" cy="441000"/>
           </a:xfrm>
           <a:prstGeom prst="rect">
             <a:avLst/>
@@ -9591,7 +9213,7 @@
         <p:spPr>
           <a:xfrm>
             <a:off x="592920" y="6450480"/>
-            <a:ext cx="722880" cy="219240"/>
+            <a:ext cx="722520" cy="218880"/>
           </a:xfrm>
           <a:prstGeom prst="rect">
             <a:avLst/>
@@ -9642,7 +9264,7 @@
         <p:spPr>
           <a:xfrm>
             <a:off x="1946520" y="6450480"/>
-            <a:ext cx="1145520" cy="219240"/>
+            <a:ext cx="1145160" cy="218880"/>
           </a:xfrm>
           <a:prstGeom prst="rect">
             <a:avLst/>
@@ -10805,7 +10427,7 @@
         <p:spPr>
           <a:xfrm>
             <a:off x="592920" y="776160"/>
-            <a:ext cx="11017800" cy="441360"/>
+            <a:ext cx="11017440" cy="441000"/>
           </a:xfrm>
           <a:prstGeom prst="rect">
             <a:avLst/>
@@ -10831,7 +10453,7 @@
         <p:spPr>
           <a:xfrm>
             <a:off x="592920" y="6450480"/>
-            <a:ext cx="722880" cy="219240"/>
+            <a:ext cx="722520" cy="218880"/>
           </a:xfrm>
           <a:prstGeom prst="rect">
             <a:avLst/>
@@ -10882,7 +10504,7 @@
         <p:spPr>
           <a:xfrm>
             <a:off x="1946520" y="6450480"/>
-            <a:ext cx="1145520" cy="219240"/>
+            <a:ext cx="1145160" cy="218880"/>
           </a:xfrm>
           <a:prstGeom prst="rect">
             <a:avLst/>
@@ -12042,7 +11664,7 @@
         <p:spPr>
           <a:xfrm>
             <a:off x="6675120" y="1554480"/>
-            <a:ext cx="5668560" cy="3161160"/>
+            <a:ext cx="5668200" cy="3160800"/>
           </a:xfrm>
           <a:prstGeom prst="rect">
             <a:avLst/>
@@ -12222,8 +11844,8 @@
         </p:nvSpPr>
         <p:spPr>
           <a:xfrm>
-            <a:off x="592920" y="776160"/>
-            <a:ext cx="11017800" cy="441360"/>
+            <a:off x="227160" y="-443880"/>
+            <a:ext cx="11017440" cy="441000"/>
           </a:xfrm>
           <a:prstGeom prst="rect">
             <a:avLst/>
@@ -12248,8 +11870,8 @@
         </p:nvSpPr>
         <p:spPr>
           <a:xfrm>
-            <a:off x="592920" y="6450480"/>
-            <a:ext cx="722880" cy="219240"/>
+            <a:off x="227160" y="5230440"/>
+            <a:ext cx="722520" cy="218880"/>
           </a:xfrm>
           <a:prstGeom prst="rect">
             <a:avLst/>
@@ -12299,8 +11921,8 @@
         </p:nvSpPr>
         <p:spPr>
           <a:xfrm>
-            <a:off x="1946520" y="6450480"/>
-            <a:ext cx="1145520" cy="219240"/>
+            <a:off x="1580760" y="5230440"/>
+            <a:ext cx="1145160" cy="218880"/>
           </a:xfrm>
           <a:prstGeom prst="rect">
             <a:avLst/>
@@ -12350,8 +11972,8 @@
         </p:nvSpPr>
         <p:spPr>
           <a:xfrm>
-            <a:off x="822960" y="2103120"/>
-            <a:ext cx="1919520" cy="1188000"/>
+            <a:off x="8412480" y="1797480"/>
+            <a:ext cx="3017520" cy="1187640"/>
           </a:xfrm>
           <a:prstGeom prst="rect">
             <a:avLst/>
@@ -12389,7 +12011,7 @@
                 <a:latin typeface="Arial"/>
                 <a:ea typeface="DejaVu Sans"/>
               </a:rPr>
-              <a:t>LangChain</a:t>
+              <a:t>Vector Database: Weaviate</a:t>
             </a:r>
             <a:endParaRPr b="0" lang="en-US" sz="1800" spc="-1" strike="noStrike">
               <a:latin typeface="Arial"/>
@@ -12405,8 +12027,8 @@
         </p:nvSpPr>
         <p:spPr>
           <a:xfrm>
-            <a:off x="6675120" y="2377440"/>
-            <a:ext cx="1919520" cy="1188000"/>
+            <a:off x="3840480" y="3627360"/>
+            <a:ext cx="3291840" cy="1187640"/>
           </a:xfrm>
           <a:prstGeom prst="rect">
             <a:avLst/>
@@ -12444,7 +12066,7 @@
                 <a:latin typeface="Arial"/>
                 <a:ea typeface="DejaVu Sans"/>
               </a:rPr>
-              <a:t>Weaviate</a:t>
+              <a:t>HuggingFace: LLaMA</a:t>
             </a:r>
             <a:endParaRPr b="0" lang="en-US" sz="1800" spc="-1" strike="noStrike">
               <a:latin typeface="Arial"/>
@@ -12460,8 +12082,8 @@
         </p:nvSpPr>
         <p:spPr>
           <a:xfrm>
-            <a:off x="4846320" y="4297680"/>
-            <a:ext cx="1919520" cy="1188000"/>
+            <a:off x="4206240" y="1797480"/>
+            <a:ext cx="2467800" cy="1187640"/>
           </a:xfrm>
           <a:prstGeom prst="rect">
             <a:avLst/>
@@ -12499,7 +12121,7 @@
                 <a:latin typeface="Arial"/>
                 <a:ea typeface="DejaVu Sans"/>
               </a:rPr>
-              <a:t>HuggingFace: LLM</a:t>
+              <a:t>MongoDB</a:t>
             </a:r>
             <a:endParaRPr b="0" lang="en-US" sz="1800" spc="-1" strike="noStrike">
               <a:latin typeface="Arial"/>
@@ -12515,8 +12137,8 @@
         </p:nvSpPr>
         <p:spPr>
           <a:xfrm>
-            <a:off x="4297680" y="2743200"/>
-            <a:ext cx="1919520" cy="1188000"/>
+            <a:off x="275400" y="1798560"/>
+            <a:ext cx="2467800" cy="1187640"/>
           </a:xfrm>
           <a:prstGeom prst="rect">
             <a:avLst/>
@@ -12554,83 +12176,612 @@
                 <a:latin typeface="Arial"/>
                 <a:ea typeface="DejaVu Sans"/>
               </a:rPr>
-              <a:t>MongoDB</a:t>
+              <a:t>SerpAPI/</a:t>
+            </a:r>
+            <a:r>
+              <a:rPr b="0" lang="en-US" sz="1800" spc="-1" strike="noStrike">
+                <a:solidFill>
+                  <a:srgbClr val="ffffd7"/>
+                </a:solidFill>
+                <a:latin typeface="Arial"/>
+                <a:ea typeface="DejaVu Sans"/>
+              </a:rPr>
+              <a:t>DuckDuck</a:t>
+            </a:r>
+            <a:r>
+              <a:rPr b="0" lang="en-US" sz="1800" spc="-1" strike="noStrike">
+                <a:solidFill>
+                  <a:srgbClr val="ffffd7"/>
+                </a:solidFill>
+                <a:latin typeface="Arial"/>
+                <a:ea typeface="DejaVu Sans"/>
+              </a:rPr>
+              <a:t>Go </a:t>
             </a:r>
             <a:endParaRPr b="0" lang="en-US" sz="1800" spc="-1" strike="noStrike">
               <a:latin typeface="Arial"/>
             </a:endParaRPr>
           </a:p>
-        </p:txBody>
-      </p:sp>
-      <p:pic>
-        <p:nvPicPr>
-          <p:cNvPr id="160" name="" descr=""/>
-          <p:cNvPicPr/>
+          <a:p>
+            <a:pPr algn="ctr">
+              <a:lnSpc>
+                <a:spcPct val="100000"/>
+              </a:lnSpc>
+            </a:pPr>
+            <a:r>
+              <a:rPr b="0" lang="en-US" sz="1800" spc="-1" strike="noStrike">
+                <a:solidFill>
+                  <a:srgbClr val="ffffd7"/>
+                </a:solidFill>
+                <a:latin typeface="Arial"/>
+                <a:ea typeface="DejaVu Sans"/>
+              </a:rPr>
+              <a:t>Search</a:t>
+            </a:r>
+            <a:endParaRPr b="0" lang="en-US" sz="1800" spc="-1" strike="noStrike">
+              <a:latin typeface="Arial"/>
+            </a:endParaRPr>
+          </a:p>
+        </p:txBody>
+      </p:sp>
+      <p:sp>
+        <p:nvSpPr>
+          <p:cNvPr id="160" name="Line 8"/>
+          <p:cNvSpPr/>
           <p:nvPr/>
-        </p:nvPicPr>
-        <p:blipFill>
-          <a:blip r:embed="rId1"/>
-          <a:stretch/>
-        </p:blipFill>
-        <p:spPr>
-          <a:xfrm>
-            <a:off x="4754880" y="457200"/>
-            <a:ext cx="7783920" cy="4070160"/>
-          </a:xfrm>
-          <a:prstGeom prst="rect">
-            <a:avLst/>
-          </a:prstGeom>
+        </p:nvSpPr>
+        <p:spPr>
+          <a:xfrm>
+            <a:off x="6674040" y="2346120"/>
+            <a:ext cx="1738440" cy="0"/>
+          </a:xfrm>
+          <a:prstGeom prst="line">
+            <a:avLst/>
+          </a:prstGeom>
+          <a:ln>
+            <a:solidFill>
+              <a:srgbClr val="3465a4"/>
+            </a:solidFill>
+            <a:tailEnd len="med" type="triangle" w="med"/>
+          </a:ln>
+        </p:spPr>
+        <p:style>
+          <a:lnRef idx="0"/>
+          <a:fillRef idx="0"/>
+          <a:effectRef idx="0"/>
+          <a:fontRef idx="minor"/>
+        </p:style>
+      </p:sp>
+      <p:sp>
+        <p:nvSpPr>
+          <p:cNvPr id="161" name="TextShape 9"/>
+          <p:cNvSpPr txBox="1"/>
+          <p:nvPr/>
+        </p:nvSpPr>
+        <p:spPr>
+          <a:xfrm>
+            <a:off x="6858000" y="1888920"/>
+            <a:ext cx="1463040" cy="346320"/>
+          </a:xfrm>
+          <a:prstGeom prst="rect">
+            <a:avLst/>
+          </a:prstGeom>
+          <a:noFill/>
           <a:ln>
             <a:noFill/>
           </a:ln>
         </p:spPr>
-      </p:pic>
-      <p:pic>
-        <p:nvPicPr>
-          <p:cNvPr id="161" name="" descr=""/>
-          <p:cNvPicPr/>
+        <p:txBody>
+          <a:bodyPr lIns="90000" rIns="90000" tIns="45000" bIns="45000">
+            <a:noAutofit/>
+          </a:bodyPr>
+          <a:p>
+            <a:r>
+              <a:rPr b="0" lang="en-US" sz="1800" spc="-1" strike="noStrike">
+                <a:latin typeface="Arial"/>
+              </a:rPr>
+              <a:t>Splitting</a:t>
+            </a:r>
+            <a:endParaRPr b="0" lang="en-US" sz="1800" spc="-1" strike="noStrike">
+              <a:latin typeface="Arial"/>
+            </a:endParaRPr>
+          </a:p>
+        </p:txBody>
+      </p:sp>
+      <p:sp>
+        <p:nvSpPr>
+          <p:cNvPr id="162" name="TextShape 10"/>
+          <p:cNvSpPr txBox="1"/>
           <p:nvPr/>
-        </p:nvPicPr>
-        <p:blipFill>
-          <a:blip r:embed="rId2"/>
-          <a:stretch/>
-        </p:blipFill>
-        <p:spPr>
-          <a:xfrm>
-            <a:off x="914400" y="5545440"/>
-            <a:ext cx="6452280" cy="3049200"/>
-          </a:xfrm>
-          <a:prstGeom prst="rect">
-            <a:avLst/>
-          </a:prstGeom>
+        </p:nvSpPr>
+        <p:spPr>
+          <a:xfrm>
+            <a:off x="6858000" y="2437560"/>
+            <a:ext cx="1463040" cy="346320"/>
+          </a:xfrm>
+          <a:prstGeom prst="rect">
+            <a:avLst/>
+          </a:prstGeom>
+          <a:noFill/>
           <a:ln>
             <a:noFill/>
           </a:ln>
         </p:spPr>
-      </p:pic>
-      <p:pic>
-        <p:nvPicPr>
-          <p:cNvPr id="162" name="" descr=""/>
-          <p:cNvPicPr/>
+        <p:txBody>
+          <a:bodyPr lIns="90000" rIns="90000" tIns="45000" bIns="45000">
+            <a:noAutofit/>
+          </a:bodyPr>
+          <a:p>
+            <a:r>
+              <a:rPr b="0" lang="en-US" sz="1800" spc="-1" strike="noStrike">
+                <a:latin typeface="Arial"/>
+              </a:rPr>
+              <a:t>Embeddin</a:t>
+            </a:r>
+            <a:r>
+              <a:rPr b="0" lang="en-US" sz="1800" spc="-1" strike="noStrike">
+                <a:latin typeface="Arial"/>
+              </a:rPr>
+              <a:t>g</a:t>
+            </a:r>
+            <a:endParaRPr b="0" lang="en-US" sz="1800" spc="-1" strike="noStrike">
+              <a:latin typeface="Arial"/>
+            </a:endParaRPr>
+          </a:p>
+        </p:txBody>
+      </p:sp>
+      <p:sp>
+        <p:nvSpPr>
+          <p:cNvPr id="163" name="Line 11"/>
+          <p:cNvSpPr/>
           <p:nvPr/>
-        </p:nvPicPr>
-        <p:blipFill>
-          <a:blip r:embed="rId3"/>
-          <a:stretch/>
-        </p:blipFill>
-        <p:spPr>
-          <a:xfrm>
-            <a:off x="3657600" y="5303520"/>
-            <a:ext cx="8189640" cy="4126320"/>
-          </a:xfrm>
-          <a:prstGeom prst="rect">
-            <a:avLst/>
-          </a:prstGeom>
+        </p:nvSpPr>
+        <p:spPr>
+          <a:xfrm>
+            <a:off x="2743200" y="2346120"/>
+            <a:ext cx="1463040" cy="0"/>
+          </a:xfrm>
+          <a:prstGeom prst="line">
+            <a:avLst/>
+          </a:prstGeom>
+          <a:ln>
+            <a:solidFill>
+              <a:srgbClr val="3465a4"/>
+            </a:solidFill>
+            <a:tailEnd len="med" type="triangle" w="med"/>
+          </a:ln>
+        </p:spPr>
+        <p:style>
+          <a:lnRef idx="0"/>
+          <a:fillRef idx="0"/>
+          <a:effectRef idx="0"/>
+          <a:fontRef idx="minor"/>
+        </p:style>
+      </p:sp>
+      <p:cxnSp>
+        <p:nvCxnSpPr>
+          <p:cNvPr id="164" name="Line 12"/>
+          <p:cNvCxnSpPr/>
+          <p:nvPr/>
+        </p:nvCxnSpPr>
+        <p:spPr>
+          <a:xfrm>
+            <a:off x="0" y="0"/>
+            <a:ext cx="360" cy="360"/>
+          </a:xfrm>
+          <a:prstGeom prst="line">
+            <a:avLst/>
+          </a:prstGeom>
+          <a:ln>
+            <a:solidFill>
+              <a:srgbClr val="3465a4"/>
+            </a:solidFill>
+            <a:tailEnd len="med" type="triangle" w="med"/>
+          </a:ln>
+        </p:spPr>
+      </p:cxnSp>
+      <p:sp>
+        <p:nvSpPr>
+          <p:cNvPr id="165" name="TextShape 13"/>
+          <p:cNvSpPr txBox="1"/>
+          <p:nvPr/>
+        </p:nvSpPr>
+        <p:spPr>
+          <a:xfrm>
+            <a:off x="7315200" y="3005640"/>
+            <a:ext cx="1463040" cy="346320"/>
+          </a:xfrm>
+          <a:prstGeom prst="rect">
+            <a:avLst/>
+          </a:prstGeom>
+          <a:noFill/>
           <a:ln>
             <a:noFill/>
           </a:ln>
         </p:spPr>
-      </p:pic>
+        <p:txBody>
+          <a:bodyPr lIns="90000" rIns="90000" tIns="45000" bIns="45000">
+            <a:noAutofit/>
+          </a:bodyPr>
+          <a:p>
+            <a:r>
+              <a:rPr b="0" lang="en-US" sz="1800" spc="-1" strike="noStrike">
+                <a:latin typeface="Arial"/>
+              </a:rPr>
+              <a:t>Training</a:t>
+            </a:r>
+            <a:endParaRPr b="0" lang="en-US" sz="1800" spc="-1" strike="noStrike">
+              <a:latin typeface="Arial"/>
+            </a:endParaRPr>
+          </a:p>
+        </p:txBody>
+      </p:sp>
+      <p:sp>
+        <p:nvSpPr>
+          <p:cNvPr id="166" name="TextShape 14"/>
+          <p:cNvSpPr txBox="1"/>
+          <p:nvPr/>
+        </p:nvSpPr>
+        <p:spPr>
+          <a:xfrm>
+            <a:off x="6858000" y="1888920"/>
+            <a:ext cx="1463040" cy="346320"/>
+          </a:xfrm>
+          <a:prstGeom prst="rect">
+            <a:avLst/>
+          </a:prstGeom>
+          <a:noFill/>
+          <a:ln>
+            <a:noFill/>
+          </a:ln>
+        </p:spPr>
+        <p:txBody>
+          <a:bodyPr lIns="90000" rIns="90000" tIns="45000" bIns="45000">
+            <a:noAutofit/>
+          </a:bodyPr>
+          <a:p>
+            <a:r>
+              <a:rPr b="0" lang="en-US" sz="1800" spc="-1" strike="noStrike">
+                <a:latin typeface="Arial"/>
+              </a:rPr>
+              <a:t>Splitting</a:t>
+            </a:r>
+            <a:endParaRPr b="0" lang="en-US" sz="1800" spc="-1" strike="noStrike">
+              <a:latin typeface="Arial"/>
+            </a:endParaRPr>
+          </a:p>
+        </p:txBody>
+      </p:sp>
+      <p:sp>
+        <p:nvSpPr>
+          <p:cNvPr id="167" name="TextShape 15"/>
+          <p:cNvSpPr txBox="1"/>
+          <p:nvPr/>
+        </p:nvSpPr>
+        <p:spPr>
+          <a:xfrm>
+            <a:off x="7335720" y="3351960"/>
+            <a:ext cx="1294920" cy="346320"/>
+          </a:xfrm>
+          <a:prstGeom prst="rect">
+            <a:avLst/>
+          </a:prstGeom>
+          <a:noFill/>
+          <a:ln>
+            <a:noFill/>
+          </a:ln>
+        </p:spPr>
+        <p:txBody>
+          <a:bodyPr lIns="90000" rIns="90000" tIns="45000" bIns="45000">
+            <a:noAutofit/>
+          </a:bodyPr>
+          <a:p>
+            <a:pPr>
+              <a:lnSpc>
+                <a:spcPct val="100000"/>
+              </a:lnSpc>
+            </a:pPr>
+            <a:r>
+              <a:rPr b="0" lang="en-US" sz="1800" spc="-1" strike="noStrike">
+                <a:latin typeface="Arial"/>
+              </a:rPr>
+              <a:t>Application</a:t>
+            </a:r>
+            <a:endParaRPr b="0" lang="en-US" sz="1800" spc="-1" strike="noStrike">
+              <a:latin typeface="Arial"/>
+            </a:endParaRPr>
+          </a:p>
+        </p:txBody>
+      </p:sp>
+      <p:sp>
+        <p:nvSpPr>
+          <p:cNvPr id="168" name="CustomShape 16"/>
+          <p:cNvSpPr/>
+          <p:nvPr/>
+        </p:nvSpPr>
+        <p:spPr>
+          <a:xfrm>
+            <a:off x="9692640" y="3698280"/>
+            <a:ext cx="1371600" cy="1116720"/>
+          </a:xfrm>
+          <a:prstGeom prst="rect">
+            <a:avLst/>
+          </a:prstGeom>
+          <a:solidFill>
+            <a:srgbClr val="729fcf"/>
+          </a:solidFill>
+          <a:ln>
+            <a:solidFill>
+              <a:srgbClr val="3465a4"/>
+            </a:solidFill>
+          </a:ln>
+        </p:spPr>
+        <p:style>
+          <a:lnRef idx="0"/>
+          <a:fillRef idx="0"/>
+          <a:effectRef idx="0"/>
+          <a:fontRef idx="minor"/>
+        </p:style>
+        <p:txBody>
+          <a:bodyPr wrap="none" lIns="90000" rIns="90000" tIns="45000" bIns="45000" anchor="ctr">
+            <a:noAutofit/>
+          </a:bodyPr>
+          <a:p>
+            <a:pPr algn="ctr">
+              <a:lnSpc>
+                <a:spcPct val="100000"/>
+              </a:lnSpc>
+            </a:pPr>
+            <a:r>
+              <a:rPr b="0" lang="en-US" sz="1800" spc="-1" strike="noStrike">
+                <a:solidFill>
+                  <a:srgbClr val="ffffd7"/>
+                </a:solidFill>
+                <a:latin typeface="Arial"/>
+                <a:ea typeface="DejaVu Sans"/>
+              </a:rPr>
+              <a:t>Query</a:t>
+            </a:r>
+            <a:endParaRPr b="0" lang="en-US" sz="1800" spc="-1" strike="noStrike">
+              <a:latin typeface="Arial"/>
+            </a:endParaRPr>
+          </a:p>
+        </p:txBody>
+      </p:sp>
+      <p:sp>
+        <p:nvSpPr>
+          <p:cNvPr id="169" name="Line 17"/>
+          <p:cNvSpPr/>
+          <p:nvPr/>
+        </p:nvSpPr>
+        <p:spPr>
+          <a:xfrm flipH="1">
+            <a:off x="7132320" y="4266360"/>
+            <a:ext cx="2560320" cy="0"/>
+          </a:xfrm>
+          <a:prstGeom prst="line">
+            <a:avLst/>
+          </a:prstGeom>
+          <a:ln>
+            <a:solidFill>
+              <a:srgbClr val="3465a4"/>
+            </a:solidFill>
+            <a:tailEnd len="med" type="triangle" w="med"/>
+          </a:ln>
+        </p:spPr>
+        <p:style>
+          <a:lnRef idx="0"/>
+          <a:fillRef idx="0"/>
+          <a:effectRef idx="0"/>
+          <a:fontRef idx="minor"/>
+        </p:style>
+      </p:sp>
+      <p:sp>
+        <p:nvSpPr>
+          <p:cNvPr id="170" name="TextShape 18"/>
+          <p:cNvSpPr txBox="1"/>
+          <p:nvPr/>
+        </p:nvSpPr>
+        <p:spPr>
+          <a:xfrm>
+            <a:off x="7680960" y="3828600"/>
+            <a:ext cx="1752120" cy="346320"/>
+          </a:xfrm>
+          <a:prstGeom prst="rect">
+            <a:avLst/>
+          </a:prstGeom>
+          <a:noFill/>
+          <a:ln>
+            <a:noFill/>
+          </a:ln>
+        </p:spPr>
+        <p:txBody>
+          <a:bodyPr lIns="90000" rIns="90000" tIns="45000" bIns="45000">
+            <a:noAutofit/>
+          </a:bodyPr>
+          <a:p>
+            <a:pPr>
+              <a:lnSpc>
+                <a:spcPct val="100000"/>
+              </a:lnSpc>
+            </a:pPr>
+            <a:r>
+              <a:rPr b="0" lang="en-US" sz="1800" spc="-1" strike="noStrike">
+                <a:latin typeface="Arial"/>
+              </a:rPr>
+              <a:t>Send </a:t>
+            </a:r>
+            <a:r>
+              <a:rPr b="0" lang="en-US" sz="1800" spc="-1" strike="noStrike">
+                <a:latin typeface="Arial"/>
+              </a:rPr>
+              <a:t>questions</a:t>
+            </a:r>
+            <a:endParaRPr b="0" lang="en-US" sz="1800" spc="-1" strike="noStrike">
+              <a:latin typeface="Arial"/>
+            </a:endParaRPr>
+          </a:p>
+        </p:txBody>
+      </p:sp>
+      <p:sp>
+        <p:nvSpPr>
+          <p:cNvPr id="171" name="CustomShape 19"/>
+          <p:cNvSpPr/>
+          <p:nvPr/>
+        </p:nvSpPr>
+        <p:spPr>
+          <a:xfrm>
+            <a:off x="914400" y="3698280"/>
+            <a:ext cx="1371600" cy="1116720"/>
+          </a:xfrm>
+          <a:prstGeom prst="rect">
+            <a:avLst/>
+          </a:prstGeom>
+          <a:solidFill>
+            <a:srgbClr val="729fcf"/>
+          </a:solidFill>
+          <a:ln>
+            <a:solidFill>
+              <a:srgbClr val="3465a4"/>
+            </a:solidFill>
+          </a:ln>
+        </p:spPr>
+        <p:style>
+          <a:lnRef idx="0"/>
+          <a:fillRef idx="0"/>
+          <a:effectRef idx="0"/>
+          <a:fontRef idx="minor"/>
+        </p:style>
+        <p:txBody>
+          <a:bodyPr wrap="none" lIns="90000" rIns="90000" tIns="45000" bIns="45000" anchor="ctr">
+            <a:noAutofit/>
+          </a:bodyPr>
+          <a:p>
+            <a:pPr algn="ctr">
+              <a:lnSpc>
+                <a:spcPct val="100000"/>
+              </a:lnSpc>
+            </a:pPr>
+            <a:r>
+              <a:rPr b="0" lang="en-US" sz="1800" spc="-1" strike="noStrike">
+                <a:solidFill>
+                  <a:srgbClr val="ffffd7"/>
+                </a:solidFill>
+                <a:latin typeface="Arial"/>
+                <a:ea typeface="DejaVu Sans"/>
+              </a:rPr>
+              <a:t>Responses</a:t>
+            </a:r>
+            <a:endParaRPr b="0" lang="en-US" sz="1800" spc="-1" strike="noStrike">
+              <a:latin typeface="Arial"/>
+            </a:endParaRPr>
+          </a:p>
+        </p:txBody>
+      </p:sp>
+      <p:sp>
+        <p:nvSpPr>
+          <p:cNvPr id="172" name="Line 20"/>
+          <p:cNvSpPr/>
+          <p:nvPr/>
+        </p:nvSpPr>
+        <p:spPr>
+          <a:xfrm flipH="1">
+            <a:off x="2286000" y="4266360"/>
+            <a:ext cx="1554480" cy="0"/>
+          </a:xfrm>
+          <a:prstGeom prst="line">
+            <a:avLst/>
+          </a:prstGeom>
+          <a:ln>
+            <a:solidFill>
+              <a:srgbClr val="3465a4"/>
+            </a:solidFill>
+            <a:tailEnd len="med" type="triangle" w="med"/>
+          </a:ln>
+        </p:spPr>
+        <p:style>
+          <a:lnRef idx="0"/>
+          <a:fillRef idx="0"/>
+          <a:effectRef idx="0"/>
+          <a:fontRef idx="minor"/>
+        </p:style>
+      </p:sp>
+      <p:sp>
+        <p:nvSpPr>
+          <p:cNvPr id="173" name="TextShape 21"/>
+          <p:cNvSpPr txBox="1"/>
+          <p:nvPr/>
+        </p:nvSpPr>
+        <p:spPr>
+          <a:xfrm>
+            <a:off x="2834640" y="1888920"/>
+            <a:ext cx="1463040" cy="346320"/>
+          </a:xfrm>
+          <a:prstGeom prst="rect">
+            <a:avLst/>
+          </a:prstGeom>
+          <a:noFill/>
+          <a:ln>
+            <a:noFill/>
+          </a:ln>
+        </p:spPr>
+        <p:txBody>
+          <a:bodyPr lIns="90000" rIns="90000" tIns="45000" bIns="45000">
+            <a:noAutofit/>
+          </a:bodyPr>
+          <a:p>
+            <a:r>
+              <a:rPr b="0" lang="en-US" sz="1800" spc="-1" strike="noStrike">
+                <a:latin typeface="Arial"/>
+              </a:rPr>
+              <a:t>Raw Data</a:t>
+            </a:r>
+            <a:endParaRPr b="0" lang="en-US" sz="1800" spc="-1" strike="noStrike">
+              <a:latin typeface="Arial"/>
+            </a:endParaRPr>
+          </a:p>
+        </p:txBody>
+      </p:sp>
+      <p:sp>
+        <p:nvSpPr>
+          <p:cNvPr id="174" name="TextShape 22"/>
+          <p:cNvSpPr txBox="1"/>
+          <p:nvPr/>
+        </p:nvSpPr>
+        <p:spPr>
+          <a:xfrm>
+            <a:off x="189720" y="91440"/>
+            <a:ext cx="10417320" cy="503640"/>
+          </a:xfrm>
+          <a:prstGeom prst="rect">
+            <a:avLst/>
+          </a:prstGeom>
+          <a:noFill/>
+          <a:ln>
+            <a:noFill/>
+          </a:ln>
+        </p:spPr>
+        <p:txBody>
+          <a:bodyPr lIns="90000" rIns="90000" tIns="45000" bIns="45000">
+            <a:noAutofit/>
+          </a:bodyPr>
+          <a:p>
+            <a:r>
+              <a:rPr b="0" lang="en-US" sz="2800" spc="-1" strike="noStrike">
+                <a:solidFill>
+                  <a:srgbClr val="00a3e0"/>
+                </a:solidFill>
+                <a:latin typeface="Trebuchet MS"/>
+                <a:ea typeface="DejaVu Sans"/>
+              </a:rPr>
+              <a:t>Langchain-based Retrieval-Augmented Generation (RAG)</a:t>
+            </a:r>
+            <a:endParaRPr b="0" lang="en-US" sz="2800" spc="-1" strike="noStrike">
+              <a:latin typeface="Arial"/>
+            </a:endParaRPr>
+          </a:p>
+        </p:txBody>
+      </p:sp>
     </p:spTree>
   </p:cSld>
   <mc:AlternateContent>
@@ -12663,14 +12814,14 @@
       </p:grpSpPr>
       <p:sp>
         <p:nvSpPr>
-          <p:cNvPr id="163" name="CustomShape 1"/>
+          <p:cNvPr id="175" name="CustomShape 1"/>
           <p:cNvSpPr/>
           <p:nvPr/>
         </p:nvSpPr>
         <p:spPr>
           <a:xfrm>
             <a:off x="366840" y="113040"/>
-            <a:ext cx="11017800" cy="441360"/>
+            <a:ext cx="11017440" cy="441000"/>
           </a:xfrm>
           <a:prstGeom prst="rect">
             <a:avLst/>
@@ -12714,14 +12865,14 @@
       </p:sp>
       <p:sp>
         <p:nvSpPr>
-          <p:cNvPr id="164" name="CustomShape 2"/>
+          <p:cNvPr id="176" name="CustomShape 2"/>
           <p:cNvSpPr/>
           <p:nvPr/>
         </p:nvSpPr>
         <p:spPr>
           <a:xfrm>
             <a:off x="592920" y="6450480"/>
-            <a:ext cx="722880" cy="219240"/>
+            <a:ext cx="722520" cy="218880"/>
           </a:xfrm>
           <a:prstGeom prst="rect">
             <a:avLst/>
@@ -12765,14 +12916,14 @@
       </p:sp>
       <p:sp>
         <p:nvSpPr>
-          <p:cNvPr id="165" name="CustomShape 3"/>
+          <p:cNvPr id="177" name="CustomShape 3"/>
           <p:cNvSpPr/>
           <p:nvPr/>
         </p:nvSpPr>
         <p:spPr>
           <a:xfrm>
             <a:off x="1946520" y="6450480"/>
-            <a:ext cx="1145520" cy="219240"/>
+            <a:ext cx="1145160" cy="218880"/>
           </a:xfrm>
           <a:prstGeom prst="rect">
             <a:avLst/>
@@ -12816,7 +12967,7 @@
       </p:sp>
       <p:graphicFrame>
         <p:nvGraphicFramePr>
-          <p:cNvPr id="166" name="Table 4"/>
+          <p:cNvPr id="178" name="Table 4"/>
           <p:cNvGraphicFramePr/>
           <p:nvPr/>
         </p:nvGraphicFramePr>
@@ -13034,14 +13185,14 @@
       </p:graphicFrame>
       <p:sp>
         <p:nvSpPr>
-          <p:cNvPr id="167" name="CustomShape 5"/>
+          <p:cNvPr id="179" name="CustomShape 5"/>
           <p:cNvSpPr/>
           <p:nvPr/>
         </p:nvSpPr>
         <p:spPr>
           <a:xfrm>
             <a:off x="826560" y="1188720"/>
-            <a:ext cx="7493760" cy="3929400"/>
+            <a:ext cx="6214320" cy="3929040"/>
           </a:xfrm>
           <a:prstGeom prst="rect">
             <a:avLst/>
@@ -13363,6 +13514,29 @@
           </a:p>
         </p:txBody>
       </p:sp>
+      <p:pic>
+        <p:nvPicPr>
+          <p:cNvPr id="180" name="" descr=""/>
+          <p:cNvPicPr/>
+          <p:nvPr/>
+        </p:nvPicPr>
+        <p:blipFill>
+          <a:blip r:embed="rId1"/>
+          <a:stretch/>
+        </p:blipFill>
+        <p:spPr>
+          <a:xfrm>
+            <a:off x="7043040" y="1888920"/>
+            <a:ext cx="4935600" cy="2591640"/>
+          </a:xfrm>
+          <a:prstGeom prst="rect">
+            <a:avLst/>
+          </a:prstGeom>
+          <a:ln>
+            <a:noFill/>
+          </a:ln>
+        </p:spPr>
+      </p:pic>
     </p:spTree>
   </p:cSld>
   <mc:AlternateContent>

</xml_diff>